<commit_message>
Changed project_brief to markdown file and updated presentation and class diagram
</commit_message>
<xml_diff>
--- a/Project_presentation.pptx
+++ b/Project_presentation.pptx
@@ -8,9 +8,9 @@
     <p:notesMasterId r:id="rId17"/>
   </p:notesMasterIdLst>
   <p:sldIdLst>
-    <p:sldId id="256" r:id="rId2"/>
-    <p:sldId id="257" r:id="rId3"/>
-    <p:sldId id="258" r:id="rId4"/>
+    <p:sldId id="257" r:id="rId2"/>
+    <p:sldId id="256" r:id="rId3"/>
+    <p:sldId id="272" r:id="rId4"/>
     <p:sldId id="264" r:id="rId5"/>
     <p:sldId id="259" r:id="rId6"/>
     <p:sldId id="266" r:id="rId7"/>
@@ -121,6 +121,14 @@
       </a:defRPr>
     </a:lvl9pPr>
   </p:defaultTextStyle>
+  <p:extLst>
+    <p:ext uri="{EFAFB233-063F-42B5-8137-9DF3F51BA10A}">
+      <p15:sldGuideLst xmlns:p15="http://schemas.microsoft.com/office/powerpoint/2012/main"/>
+    </p:ext>
+    <p:ext uri="{2D200454-40CA-4A62-9FC3-DE9A4176ACB9}">
+      <p15:notesGuideLst xmlns:p15="http://schemas.microsoft.com/office/powerpoint/2012/main"/>
+    </p:ext>
+  </p:extLst>
 </p:presentation>
 </file>
 
@@ -206,7 +214,7 @@
           <a:p>
             <a:fld id="{EB3F7308-8E60-F94D-B929-C6166ECB664E}" type="datetimeFigureOut">
               <a:rPr lang="en-US" smtClean="0"/>
-              <a:t>12/21/17</a:t>
+              <a:t>12/22/17</a:t>
             </a:fld>
             <a:endParaRPr lang="en-US"/>
           </a:p>
@@ -539,7 +547,7 @@
           <a:p>
             <a:fld id="{BBEBC430-17AC-5B46-A3F7-CD5FB9982876}" type="slidenum">
               <a:rPr lang="en-US" smtClean="0"/>
-              <a:t>1</a:t>
+              <a:t>2</a:t>
             </a:fld>
             <a:endParaRPr lang="en-US"/>
           </a:p>
@@ -1524,7 +1532,7 @@
             <a:fld id="{5586B75A-687E-405C-8A0B-8D00578BA2C3}" type="datetimeFigureOut">
               <a:rPr lang="en-US" smtClean="0"/>
               <a:pPr/>
-              <a:t>12/21/17</a:t>
+              <a:t>12/22/17</a:t>
             </a:fld>
             <a:endParaRPr lang="en-US" dirty="0"/>
           </a:p>
@@ -1698,7 +1706,7 @@
             <a:fld id="{5586B75A-687E-405C-8A0B-8D00578BA2C3}" type="datetimeFigureOut">
               <a:rPr lang="en-US" smtClean="0"/>
               <a:pPr/>
-              <a:t>12/21/17</a:t>
+              <a:t>12/22/17</a:t>
             </a:fld>
             <a:endParaRPr lang="en-US" dirty="0"/>
           </a:p>
@@ -1875,7 +1883,7 @@
             <a:fld id="{5586B75A-687E-405C-8A0B-8D00578BA2C3}" type="datetimeFigureOut">
               <a:rPr lang="en-US" smtClean="0"/>
               <a:pPr/>
-              <a:t>12/21/17</a:t>
+              <a:t>12/22/17</a:t>
             </a:fld>
             <a:endParaRPr lang="en-US" dirty="0"/>
           </a:p>
@@ -2042,7 +2050,7 @@
             <a:fld id="{5586B75A-687E-405C-8A0B-8D00578BA2C3}" type="datetimeFigureOut">
               <a:rPr lang="en-US" smtClean="0"/>
               <a:pPr/>
-              <a:t>12/21/17</a:t>
+              <a:t>12/22/17</a:t>
             </a:fld>
             <a:endParaRPr lang="en-US" dirty="0"/>
           </a:p>
@@ -2306,7 +2314,7 @@
             <a:fld id="{5586B75A-687E-405C-8A0B-8D00578BA2C3}" type="datetimeFigureOut">
               <a:rPr lang="en-US" smtClean="0"/>
               <a:pPr/>
-              <a:t>12/21/17</a:t>
+              <a:t>12/22/17</a:t>
             </a:fld>
             <a:endParaRPr lang="en-US" dirty="0"/>
           </a:p>
@@ -2542,7 +2550,7 @@
             <a:fld id="{5586B75A-687E-405C-8A0B-8D00578BA2C3}" type="datetimeFigureOut">
               <a:rPr lang="en-US" smtClean="0"/>
               <a:pPr/>
-              <a:t>12/21/17</a:t>
+              <a:t>12/22/17</a:t>
             </a:fld>
             <a:endParaRPr lang="en-US" dirty="0"/>
           </a:p>
@@ -2901,7 +2909,7 @@
             <a:fld id="{5586B75A-687E-405C-8A0B-8D00578BA2C3}" type="datetimeFigureOut">
               <a:rPr lang="en-US" smtClean="0"/>
               <a:pPr/>
-              <a:t>12/21/17</a:t>
+              <a:t>12/22/17</a:t>
             </a:fld>
             <a:endParaRPr lang="en-US" dirty="0"/>
           </a:p>
@@ -3046,7 +3054,7 @@
             <a:fld id="{5586B75A-687E-405C-8A0B-8D00578BA2C3}" type="datetimeFigureOut">
               <a:rPr lang="en-US" smtClean="0"/>
               <a:pPr/>
-              <a:t>12/21/17</a:t>
+              <a:t>12/22/17</a:t>
             </a:fld>
             <a:endParaRPr lang="en-US" dirty="0"/>
           </a:p>
@@ -3138,7 +3146,7 @@
             <a:fld id="{5586B75A-687E-405C-8A0B-8D00578BA2C3}" type="datetimeFigureOut">
               <a:rPr lang="en-US" smtClean="0"/>
               <a:pPr/>
-              <a:t>12/21/17</a:t>
+              <a:t>12/22/17</a:t>
             </a:fld>
             <a:endParaRPr lang="en-US" dirty="0"/>
           </a:p>
@@ -3499,7 +3507,7 @@
             <a:fld id="{5586B75A-687E-405C-8A0B-8D00578BA2C3}" type="datetimeFigureOut">
               <a:rPr lang="en-US" smtClean="0"/>
               <a:pPr/>
-              <a:t>12/21/17</a:t>
+              <a:t>12/22/17</a:t>
             </a:fld>
             <a:endParaRPr lang="en-US" dirty="0"/>
           </a:p>
@@ -3852,7 +3860,7 @@
             <a:fld id="{5586B75A-687E-405C-8A0B-8D00578BA2C3}" type="datetimeFigureOut">
               <a:rPr lang="en-US" smtClean="0"/>
               <a:pPr/>
-              <a:t>12/21/17</a:t>
+              <a:t>12/22/17</a:t>
             </a:fld>
             <a:endParaRPr lang="en-US" dirty="0"/>
           </a:p>
@@ -4088,7 +4096,7 @@
             <a:fld id="{5586B75A-687E-405C-8A0B-8D00578BA2C3}" type="datetimeFigureOut">
               <a:rPr lang="en-US" smtClean="0"/>
               <a:pPr/>
-              <a:t>12/21/17</a:t>
+              <a:t>12/22/17</a:t>
             </a:fld>
             <a:endParaRPr lang="en-US" dirty="0"/>
           </a:p>
@@ -4559,6 +4567,1316 @@
             <a:spLocks noGrp="1"/>
           </p:cNvSpPr>
           <p:nvPr>
+            <p:ph type="title"/>
+          </p:nvPr>
+        </p:nvSpPr>
+        <p:spPr>
+          <a:xfrm>
+            <a:off x="789139" y="438599"/>
+            <a:ext cx="10546915" cy="638640"/>
+          </a:xfrm>
+          <a:solidFill>
+            <a:schemeClr val="bg2">
+              <a:lumMod val="75000"/>
+            </a:schemeClr>
+          </a:solidFill>
+        </p:spPr>
+        <p:txBody>
+          <a:bodyPr>
+            <a:normAutofit fontScale="90000"/>
+          </a:bodyPr>
+          <a:lstStyle/>
+          <a:p>
+            <a:r>
+              <a:rPr lang="en-US" b="1" cap="none" dirty="0" smtClean="0">
+                <a:latin typeface="Arial" charset="0"/>
+                <a:ea typeface="Arial" charset="0"/>
+                <a:cs typeface="Arial" charset="0"/>
+              </a:rPr>
+              <a:t>Goals</a:t>
+            </a:r>
+            <a:endParaRPr lang="en-US" b="1" cap="none" dirty="0">
+              <a:latin typeface="Arial" charset="0"/>
+              <a:ea typeface="Arial" charset="0"/>
+              <a:cs typeface="Arial" charset="0"/>
+            </a:endParaRPr>
+          </a:p>
+        </p:txBody>
+      </p:sp>
+      <p:sp>
+        <p:nvSpPr>
+          <p:cNvPr id="3" name="Content Placeholder 2"/>
+          <p:cNvSpPr>
+            <a:spLocks noGrp="1"/>
+          </p:cNvSpPr>
+          <p:nvPr>
+            <p:ph idx="1"/>
+          </p:nvPr>
+        </p:nvSpPr>
+        <p:spPr>
+          <a:xfrm>
+            <a:off x="789139" y="1390389"/>
+            <a:ext cx="10546915" cy="4534421"/>
+          </a:xfrm>
+        </p:spPr>
+        <p:txBody>
+          <a:bodyPr>
+            <a:normAutofit/>
+          </a:bodyPr>
+          <a:lstStyle/>
+          <a:p>
+            <a:pPr fontAlgn="ctr"/>
+            <a:r>
+              <a:rPr lang="en-GB" sz="3200" dirty="0" smtClean="0"/>
+              <a:t>As much functionality as possible but without adding so much that its unachievable</a:t>
+            </a:r>
+          </a:p>
+          <a:p>
+            <a:pPr fontAlgn="ctr"/>
+            <a:r>
+              <a:rPr lang="en-GB" sz="3200" dirty="0" smtClean="0"/>
+              <a:t>Create an application that is complete and shippable</a:t>
+            </a:r>
+          </a:p>
+          <a:p>
+            <a:pPr lvl="1" fontAlgn="ctr"/>
+            <a:r>
+              <a:rPr lang="en-GB" sz="2800" dirty="0" smtClean="0"/>
+              <a:t>As few bugs as possible</a:t>
+            </a:r>
+            <a:endParaRPr lang="en-GB" sz="2800" dirty="0" smtClean="0"/>
+          </a:p>
+          <a:p>
+            <a:pPr fontAlgn="ctr"/>
+            <a:r>
+              <a:rPr lang="en-GB" sz="3200" dirty="0"/>
+              <a:t>Simple, clean interface</a:t>
+            </a:r>
+          </a:p>
+          <a:p>
+            <a:pPr fontAlgn="ctr"/>
+            <a:endParaRPr lang="en-GB" sz="3000" dirty="0" smtClean="0"/>
+          </a:p>
+        </p:txBody>
+      </p:sp>
+    </p:spTree>
+    <p:extLst>
+      <p:ext uri="{BB962C8B-B14F-4D97-AF65-F5344CB8AC3E}">
+        <p14:creationId xmlns:p14="http://schemas.microsoft.com/office/powerpoint/2010/main" val="922338988"/>
+      </p:ext>
+    </p:extLst>
+  </p:cSld>
+  <p:clrMapOvr>
+    <a:masterClrMapping/>
+  </p:clrMapOvr>
+  <mc:AlternateContent xmlns:mc="http://schemas.openxmlformats.org/markup-compatibility/2006" xmlns:p14="http://schemas.microsoft.com/office/powerpoint/2010/main">
+    <mc:Choice Requires="p14">
+      <p:transition spd="slow" p14:dur="2000" advTm="105910"/>
+    </mc:Choice>
+    <mc:Fallback xmlns="">
+      <p:transition spd="slow" advTm="105910"/>
+    </mc:Fallback>
+  </mc:AlternateContent>
+  <p:timing>
+    <p:tnLst>
+      <p:par>
+        <p:cTn id="1" dur="indefinite" restart="never" nodeType="tmRoot"/>
+      </p:par>
+    </p:tnLst>
+  </p:timing>
+</p:sld>
+</file>
+
+<file path=ppt/slides/slide10.xml><?xml version="1.0" encoding="utf-8"?>
+<p:sld xmlns:a="http://schemas.openxmlformats.org/drawingml/2006/main" xmlns:r="http://schemas.openxmlformats.org/officeDocument/2006/relationships" xmlns:p="http://schemas.openxmlformats.org/presentationml/2006/main">
+  <p:cSld>
+    <p:spTree>
+      <p:nvGrpSpPr>
+        <p:cNvPr id="1" name=""/>
+        <p:cNvGrpSpPr/>
+        <p:nvPr/>
+      </p:nvGrpSpPr>
+      <p:grpSpPr>
+        <a:xfrm>
+          <a:off x="0" y="0"/>
+          <a:ext cx="0" cy="0"/>
+          <a:chOff x="0" y="0"/>
+          <a:chExt cx="0" cy="0"/>
+        </a:xfrm>
+      </p:grpSpPr>
+      <p:sp>
+        <p:nvSpPr>
+          <p:cNvPr id="2" name="Title 1"/>
+          <p:cNvSpPr>
+            <a:spLocks noGrp="1"/>
+          </p:cNvSpPr>
+          <p:nvPr>
+            <p:ph type="title"/>
+          </p:nvPr>
+        </p:nvSpPr>
+        <p:spPr>
+          <a:xfrm>
+            <a:off x="789139" y="438599"/>
+            <a:ext cx="10546915" cy="638640"/>
+          </a:xfrm>
+          <a:solidFill>
+            <a:schemeClr val="bg2">
+              <a:lumMod val="75000"/>
+            </a:schemeClr>
+          </a:solidFill>
+        </p:spPr>
+        <p:txBody>
+          <a:bodyPr>
+            <a:normAutofit fontScale="90000"/>
+          </a:bodyPr>
+          <a:lstStyle/>
+          <a:p>
+            <a:r>
+              <a:rPr lang="en-US" b="1" cap="none" dirty="0" smtClean="0">
+                <a:latin typeface="Arial" charset="0"/>
+                <a:ea typeface="Arial" charset="0"/>
+                <a:cs typeface="Arial" charset="0"/>
+              </a:rPr>
+              <a:t>Explain Code </a:t>
+            </a:r>
+            <a:r>
+              <a:rPr lang="mr-IN" b="1" cap="none" dirty="0" smtClean="0">
+                <a:latin typeface="Arial" charset="0"/>
+                <a:ea typeface="Arial" charset="0"/>
+                <a:cs typeface="Arial" charset="0"/>
+              </a:rPr>
+              <a:t>–</a:t>
+            </a:r>
+            <a:r>
+              <a:rPr lang="en-US" b="1" cap="none" dirty="0" smtClean="0">
+                <a:latin typeface="Arial" charset="0"/>
+                <a:ea typeface="Arial" charset="0"/>
+                <a:cs typeface="Arial" charset="0"/>
+              </a:rPr>
+              <a:t> Amount Conversion - Save</a:t>
+            </a:r>
+            <a:endParaRPr lang="en-US" b="1" cap="none" dirty="0">
+              <a:latin typeface="Arial" charset="0"/>
+              <a:ea typeface="Arial" charset="0"/>
+              <a:cs typeface="Arial" charset="0"/>
+            </a:endParaRPr>
+          </a:p>
+        </p:txBody>
+      </p:sp>
+      <p:pic>
+        <p:nvPicPr>
+          <p:cNvPr id="5" name="Content Placeholder 4"/>
+          <p:cNvPicPr>
+            <a:picLocks noGrp="1" noChangeAspect="1"/>
+          </p:cNvPicPr>
+          <p:nvPr>
+            <p:ph idx="1"/>
+          </p:nvPr>
+        </p:nvPicPr>
+        <p:blipFill>
+          <a:blip r:embed="rId3">
+            <a:extLst>
+              <a:ext uri="{28A0092B-C50C-407E-A947-70E740481C1C}">
+                <a14:useLocalDpi xmlns:a14="http://schemas.microsoft.com/office/drawing/2010/main" val="0"/>
+              </a:ext>
+            </a:extLst>
+          </a:blip>
+          <a:stretch>
+            <a:fillRect/>
+          </a:stretch>
+        </p:blipFill>
+        <p:spPr>
+          <a:xfrm>
+            <a:off x="789139" y="1403985"/>
+            <a:ext cx="10546915" cy="4981575"/>
+          </a:xfrm>
+        </p:spPr>
+      </p:pic>
+      <p:sp>
+        <p:nvSpPr>
+          <p:cNvPr id="6" name="Frame 5"/>
+          <p:cNvSpPr/>
+          <p:nvPr/>
+        </p:nvSpPr>
+        <p:spPr>
+          <a:xfrm>
+            <a:off x="2057400" y="2545080"/>
+            <a:ext cx="5608320" cy="487680"/>
+          </a:xfrm>
+          <a:prstGeom prst="frame">
+            <a:avLst/>
+          </a:prstGeom>
+          <a:solidFill>
+            <a:srgbClr val="FF0000"/>
+          </a:solidFill>
+          <a:ln>
+            <a:solidFill>
+              <a:srgbClr val="FF0000"/>
+            </a:solidFill>
+          </a:ln>
+        </p:spPr>
+        <p:style>
+          <a:lnRef idx="2">
+            <a:schemeClr val="accent1">
+              <a:shade val="50000"/>
+            </a:schemeClr>
+          </a:lnRef>
+          <a:fillRef idx="1">
+            <a:schemeClr val="accent1"/>
+          </a:fillRef>
+          <a:effectRef idx="0">
+            <a:schemeClr val="accent1"/>
+          </a:effectRef>
+          <a:fontRef idx="minor">
+            <a:schemeClr val="lt1"/>
+          </a:fontRef>
+        </p:style>
+        <p:txBody>
+          <a:bodyPr rtlCol="0" anchor="ctr"/>
+          <a:lstStyle/>
+          <a:p>
+            <a:pPr algn="ctr"/>
+            <a:endParaRPr lang="en-US">
+              <a:solidFill>
+                <a:schemeClr val="tx1"/>
+              </a:solidFill>
+            </a:endParaRPr>
+          </a:p>
+        </p:txBody>
+      </p:sp>
+    </p:spTree>
+    <p:extLst>
+      <p:ext uri="{BB962C8B-B14F-4D97-AF65-F5344CB8AC3E}">
+        <p14:creationId xmlns:p14="http://schemas.microsoft.com/office/powerpoint/2010/main" val="1288216416"/>
+      </p:ext>
+    </p:extLst>
+  </p:cSld>
+  <p:clrMapOvr>
+    <a:masterClrMapping/>
+  </p:clrMapOvr>
+  <mc:AlternateContent xmlns:mc="http://schemas.openxmlformats.org/markup-compatibility/2006" xmlns:p14="http://schemas.microsoft.com/office/powerpoint/2010/main">
+    <mc:Choice Requires="p14">
+      <p:transition spd="slow" p14:dur="2000" advTm="20096"/>
+    </mc:Choice>
+    <mc:Fallback xmlns="">
+      <p:transition spd="slow" advTm="20096"/>
+    </mc:Fallback>
+  </mc:AlternateContent>
+  <p:timing>
+    <p:tnLst>
+      <p:par>
+        <p:cTn id="1" dur="indefinite" restart="never" nodeType="tmRoot"/>
+      </p:par>
+    </p:tnLst>
+  </p:timing>
+</p:sld>
+</file>
+
+<file path=ppt/slides/slide11.xml><?xml version="1.0" encoding="utf-8"?>
+<p:sld xmlns:a="http://schemas.openxmlformats.org/drawingml/2006/main" xmlns:r="http://schemas.openxmlformats.org/officeDocument/2006/relationships" xmlns:p="http://schemas.openxmlformats.org/presentationml/2006/main">
+  <p:cSld>
+    <p:spTree>
+      <p:nvGrpSpPr>
+        <p:cNvPr id="1" name=""/>
+        <p:cNvGrpSpPr/>
+        <p:nvPr/>
+      </p:nvGrpSpPr>
+      <p:grpSpPr>
+        <a:xfrm>
+          <a:off x="0" y="0"/>
+          <a:ext cx="0" cy="0"/>
+          <a:chOff x="0" y="0"/>
+          <a:chExt cx="0" cy="0"/>
+        </a:xfrm>
+      </p:grpSpPr>
+      <p:sp>
+        <p:nvSpPr>
+          <p:cNvPr id="2" name="Title 1"/>
+          <p:cNvSpPr>
+            <a:spLocks noGrp="1"/>
+          </p:cNvSpPr>
+          <p:nvPr>
+            <p:ph type="title"/>
+          </p:nvPr>
+        </p:nvSpPr>
+        <p:spPr>
+          <a:xfrm>
+            <a:off x="789139" y="438599"/>
+            <a:ext cx="10546915" cy="638640"/>
+          </a:xfrm>
+          <a:solidFill>
+            <a:schemeClr val="bg2">
+              <a:lumMod val="75000"/>
+            </a:schemeClr>
+          </a:solidFill>
+        </p:spPr>
+        <p:txBody>
+          <a:bodyPr>
+            <a:normAutofit fontScale="90000"/>
+          </a:bodyPr>
+          <a:lstStyle/>
+          <a:p>
+            <a:r>
+              <a:rPr lang="en-US" b="1" cap="none" dirty="0" smtClean="0">
+                <a:latin typeface="Arial" charset="0"/>
+                <a:ea typeface="Arial" charset="0"/>
+                <a:cs typeface="Arial" charset="0"/>
+              </a:rPr>
+              <a:t>Explain Code </a:t>
+            </a:r>
+            <a:r>
+              <a:rPr lang="mr-IN" b="1" cap="none" dirty="0" smtClean="0">
+                <a:latin typeface="Arial" charset="0"/>
+                <a:ea typeface="Arial" charset="0"/>
+                <a:cs typeface="Arial" charset="0"/>
+              </a:rPr>
+              <a:t>–</a:t>
+            </a:r>
+            <a:r>
+              <a:rPr lang="en-US" b="1" cap="none" dirty="0" smtClean="0">
+                <a:latin typeface="Arial" charset="0"/>
+                <a:ea typeface="Arial" charset="0"/>
+                <a:cs typeface="Arial" charset="0"/>
+              </a:rPr>
+              <a:t> Amount Conversion - View</a:t>
+            </a:r>
+            <a:endParaRPr lang="en-US" b="1" cap="none" dirty="0">
+              <a:latin typeface="Arial" charset="0"/>
+              <a:ea typeface="Arial" charset="0"/>
+              <a:cs typeface="Arial" charset="0"/>
+            </a:endParaRPr>
+          </a:p>
+        </p:txBody>
+      </p:sp>
+      <p:pic>
+        <p:nvPicPr>
+          <p:cNvPr id="7" name="Content Placeholder 6"/>
+          <p:cNvPicPr>
+            <a:picLocks noGrp="1" noChangeAspect="1"/>
+          </p:cNvPicPr>
+          <p:nvPr>
+            <p:ph idx="1"/>
+          </p:nvPr>
+        </p:nvPicPr>
+        <p:blipFill>
+          <a:blip r:embed="rId3">
+            <a:extLst>
+              <a:ext uri="{28A0092B-C50C-407E-A947-70E740481C1C}">
+                <a14:useLocalDpi xmlns:a14="http://schemas.microsoft.com/office/drawing/2010/main" val="0"/>
+              </a:ext>
+            </a:extLst>
+          </a:blip>
+          <a:stretch>
+            <a:fillRect/>
+          </a:stretch>
+        </p:blipFill>
+        <p:spPr>
+          <a:xfrm>
+            <a:off x="789139" y="1403985"/>
+            <a:ext cx="10546915" cy="4829175"/>
+          </a:xfrm>
+        </p:spPr>
+      </p:pic>
+      <p:sp>
+        <p:nvSpPr>
+          <p:cNvPr id="8" name="Frame 7"/>
+          <p:cNvSpPr/>
+          <p:nvPr/>
+        </p:nvSpPr>
+        <p:spPr>
+          <a:xfrm>
+            <a:off x="1965960" y="3413760"/>
+            <a:ext cx="7056120" cy="426720"/>
+          </a:xfrm>
+          <a:prstGeom prst="frame">
+            <a:avLst/>
+          </a:prstGeom>
+          <a:solidFill>
+            <a:srgbClr val="FF0000"/>
+          </a:solidFill>
+          <a:ln>
+            <a:solidFill>
+              <a:srgbClr val="FF0000"/>
+            </a:solidFill>
+          </a:ln>
+        </p:spPr>
+        <p:style>
+          <a:lnRef idx="2">
+            <a:schemeClr val="accent1">
+              <a:shade val="50000"/>
+            </a:schemeClr>
+          </a:lnRef>
+          <a:fillRef idx="1">
+            <a:schemeClr val="accent1"/>
+          </a:fillRef>
+          <a:effectRef idx="0">
+            <a:schemeClr val="accent1"/>
+          </a:effectRef>
+          <a:fontRef idx="minor">
+            <a:schemeClr val="lt1"/>
+          </a:fontRef>
+        </p:style>
+        <p:txBody>
+          <a:bodyPr rtlCol="0" anchor="ctr"/>
+          <a:lstStyle/>
+          <a:p>
+            <a:pPr algn="ctr"/>
+            <a:endParaRPr lang="en-US">
+              <a:solidFill>
+                <a:schemeClr val="tx1"/>
+              </a:solidFill>
+            </a:endParaRPr>
+          </a:p>
+        </p:txBody>
+      </p:sp>
+    </p:spTree>
+    <p:extLst>
+      <p:ext uri="{BB962C8B-B14F-4D97-AF65-F5344CB8AC3E}">
+        <p14:creationId xmlns:p14="http://schemas.microsoft.com/office/powerpoint/2010/main" val="309995765"/>
+      </p:ext>
+    </p:extLst>
+  </p:cSld>
+  <p:clrMapOvr>
+    <a:masterClrMapping/>
+  </p:clrMapOvr>
+  <mc:AlternateContent xmlns:mc="http://schemas.openxmlformats.org/markup-compatibility/2006" xmlns:p14="http://schemas.microsoft.com/office/powerpoint/2010/main">
+    <mc:Choice Requires="p14">
+      <p:transition spd="slow" p14:dur="2000" advTm="21362"/>
+    </mc:Choice>
+    <mc:Fallback xmlns="">
+      <p:transition spd="slow" advTm="21362"/>
+    </mc:Fallback>
+  </mc:AlternateContent>
+  <p:timing>
+    <p:tnLst>
+      <p:par>
+        <p:cTn id="1" dur="indefinite" restart="never" nodeType="tmRoot"/>
+      </p:par>
+    </p:tnLst>
+  </p:timing>
+</p:sld>
+</file>
+
+<file path=ppt/slides/slide12.xml><?xml version="1.0" encoding="utf-8"?>
+<p:sld xmlns:a="http://schemas.openxmlformats.org/drawingml/2006/main" xmlns:r="http://schemas.openxmlformats.org/officeDocument/2006/relationships" xmlns:p="http://schemas.openxmlformats.org/presentationml/2006/main">
+  <p:cSld>
+    <p:spTree>
+      <p:nvGrpSpPr>
+        <p:cNvPr id="1" name=""/>
+        <p:cNvGrpSpPr/>
+        <p:nvPr/>
+      </p:nvGrpSpPr>
+      <p:grpSpPr>
+        <a:xfrm>
+          <a:off x="0" y="0"/>
+          <a:ext cx="0" cy="0"/>
+          <a:chOff x="0" y="0"/>
+          <a:chExt cx="0" cy="0"/>
+        </a:xfrm>
+      </p:grpSpPr>
+      <p:sp>
+        <p:nvSpPr>
+          <p:cNvPr id="2" name="Title 1"/>
+          <p:cNvSpPr>
+            <a:spLocks noGrp="1"/>
+          </p:cNvSpPr>
+          <p:nvPr>
+            <p:ph type="title"/>
+          </p:nvPr>
+        </p:nvSpPr>
+        <p:spPr>
+          <a:xfrm>
+            <a:off x="789139" y="438599"/>
+            <a:ext cx="10546915" cy="638640"/>
+          </a:xfrm>
+          <a:solidFill>
+            <a:schemeClr val="bg2">
+              <a:lumMod val="75000"/>
+            </a:schemeClr>
+          </a:solidFill>
+        </p:spPr>
+        <p:txBody>
+          <a:bodyPr>
+            <a:normAutofit fontScale="90000"/>
+          </a:bodyPr>
+          <a:lstStyle/>
+          <a:p>
+            <a:r>
+              <a:rPr lang="en-US" b="1" cap="none" dirty="0" smtClean="0">
+                <a:latin typeface="Arial" charset="0"/>
+                <a:ea typeface="Arial" charset="0"/>
+                <a:cs typeface="Arial" charset="0"/>
+              </a:rPr>
+              <a:t>Explain Code </a:t>
+            </a:r>
+            <a:r>
+              <a:rPr lang="mr-IN" b="1" cap="none" dirty="0" smtClean="0">
+                <a:latin typeface="Arial" charset="0"/>
+                <a:ea typeface="Arial" charset="0"/>
+                <a:cs typeface="Arial" charset="0"/>
+              </a:rPr>
+              <a:t>–</a:t>
+            </a:r>
+            <a:r>
+              <a:rPr lang="en-US" b="1" cap="none" dirty="0" smtClean="0">
+                <a:latin typeface="Arial" charset="0"/>
+                <a:ea typeface="Arial" charset="0"/>
+                <a:cs typeface="Arial" charset="0"/>
+              </a:rPr>
+              <a:t> Date Conversion - Method</a:t>
+            </a:r>
+            <a:endParaRPr lang="en-US" b="1" cap="none" dirty="0">
+              <a:latin typeface="Arial" charset="0"/>
+              <a:ea typeface="Arial" charset="0"/>
+              <a:cs typeface="Arial" charset="0"/>
+            </a:endParaRPr>
+          </a:p>
+        </p:txBody>
+      </p:sp>
+      <p:pic>
+        <p:nvPicPr>
+          <p:cNvPr id="4" name="Content Placeholder 3"/>
+          <p:cNvPicPr>
+            <a:picLocks noGrp="1" noChangeAspect="1"/>
+          </p:cNvPicPr>
+          <p:nvPr>
+            <p:ph idx="1"/>
+          </p:nvPr>
+        </p:nvPicPr>
+        <p:blipFill>
+          <a:blip r:embed="rId3">
+            <a:extLst>
+              <a:ext uri="{28A0092B-C50C-407E-A947-70E740481C1C}">
+                <a14:useLocalDpi xmlns:a14="http://schemas.microsoft.com/office/drawing/2010/main" val="0"/>
+              </a:ext>
+            </a:extLst>
+          </a:blip>
+          <a:stretch>
+            <a:fillRect/>
+          </a:stretch>
+        </p:blipFill>
+        <p:spPr>
+          <a:xfrm>
+            <a:off x="789139" y="1411922"/>
+            <a:ext cx="10546915" cy="3160078"/>
+          </a:xfrm>
+        </p:spPr>
+      </p:pic>
+    </p:spTree>
+    <p:extLst>
+      <p:ext uri="{BB962C8B-B14F-4D97-AF65-F5344CB8AC3E}">
+        <p14:creationId xmlns:p14="http://schemas.microsoft.com/office/powerpoint/2010/main" val="1374398235"/>
+      </p:ext>
+    </p:extLst>
+  </p:cSld>
+  <p:clrMapOvr>
+    <a:masterClrMapping/>
+  </p:clrMapOvr>
+  <mc:AlternateContent xmlns:mc="http://schemas.openxmlformats.org/markup-compatibility/2006" xmlns:p14="http://schemas.microsoft.com/office/powerpoint/2010/main">
+    <mc:Choice Requires="p14">
+      <p:transition spd="slow" p14:dur="2000" advTm="38322"/>
+    </mc:Choice>
+    <mc:Fallback xmlns="">
+      <p:transition spd="slow" advTm="38322"/>
+    </mc:Fallback>
+  </mc:AlternateContent>
+  <p:timing>
+    <p:tnLst>
+      <p:par>
+        <p:cTn id="1" dur="indefinite" restart="never" nodeType="tmRoot"/>
+      </p:par>
+    </p:tnLst>
+  </p:timing>
+</p:sld>
+</file>
+
+<file path=ppt/slides/slide13.xml><?xml version="1.0" encoding="utf-8"?>
+<p:sld xmlns:a="http://schemas.openxmlformats.org/drawingml/2006/main" xmlns:r="http://schemas.openxmlformats.org/officeDocument/2006/relationships" xmlns:p="http://schemas.openxmlformats.org/presentationml/2006/main">
+  <p:cSld>
+    <p:spTree>
+      <p:nvGrpSpPr>
+        <p:cNvPr id="1" name=""/>
+        <p:cNvGrpSpPr/>
+        <p:nvPr/>
+      </p:nvGrpSpPr>
+      <p:grpSpPr>
+        <a:xfrm>
+          <a:off x="0" y="0"/>
+          <a:ext cx="0" cy="0"/>
+          <a:chOff x="0" y="0"/>
+          <a:chExt cx="0" cy="0"/>
+        </a:xfrm>
+      </p:grpSpPr>
+      <p:sp>
+        <p:nvSpPr>
+          <p:cNvPr id="2" name="Title 1"/>
+          <p:cNvSpPr>
+            <a:spLocks noGrp="1"/>
+          </p:cNvSpPr>
+          <p:nvPr>
+            <p:ph type="title"/>
+          </p:nvPr>
+        </p:nvSpPr>
+        <p:spPr>
+          <a:xfrm>
+            <a:off x="789139" y="438599"/>
+            <a:ext cx="10546915" cy="638640"/>
+          </a:xfrm>
+          <a:solidFill>
+            <a:schemeClr val="bg2">
+              <a:lumMod val="75000"/>
+            </a:schemeClr>
+          </a:solidFill>
+        </p:spPr>
+        <p:txBody>
+          <a:bodyPr>
+            <a:normAutofit fontScale="90000"/>
+          </a:bodyPr>
+          <a:lstStyle/>
+          <a:p>
+            <a:r>
+              <a:rPr lang="en-US" b="1" cap="none" dirty="0" smtClean="0">
+                <a:latin typeface="Arial" charset="0"/>
+                <a:ea typeface="Arial" charset="0"/>
+                <a:cs typeface="Arial" charset="0"/>
+              </a:rPr>
+              <a:t>Explain Code </a:t>
+            </a:r>
+            <a:r>
+              <a:rPr lang="mr-IN" b="1" cap="none" dirty="0" smtClean="0">
+                <a:latin typeface="Arial" charset="0"/>
+                <a:ea typeface="Arial" charset="0"/>
+                <a:cs typeface="Arial" charset="0"/>
+              </a:rPr>
+              <a:t>–</a:t>
+            </a:r>
+            <a:r>
+              <a:rPr lang="en-US" b="1" cap="none" dirty="0" smtClean="0">
+                <a:latin typeface="Arial" charset="0"/>
+                <a:ea typeface="Arial" charset="0"/>
+                <a:cs typeface="Arial" charset="0"/>
+              </a:rPr>
+              <a:t> Date Conversion - View</a:t>
+            </a:r>
+            <a:endParaRPr lang="en-US" b="1" cap="none" dirty="0">
+              <a:latin typeface="Arial" charset="0"/>
+              <a:ea typeface="Arial" charset="0"/>
+              <a:cs typeface="Arial" charset="0"/>
+            </a:endParaRPr>
+          </a:p>
+        </p:txBody>
+      </p:sp>
+      <p:pic>
+        <p:nvPicPr>
+          <p:cNvPr id="7" name="Content Placeholder 6"/>
+          <p:cNvPicPr>
+            <a:picLocks noGrp="1" noChangeAspect="1"/>
+          </p:cNvPicPr>
+          <p:nvPr>
+            <p:ph idx="1"/>
+          </p:nvPr>
+        </p:nvPicPr>
+        <p:blipFill>
+          <a:blip r:embed="rId3">
+            <a:extLst>
+              <a:ext uri="{28A0092B-C50C-407E-A947-70E740481C1C}">
+                <a14:useLocalDpi xmlns:a14="http://schemas.microsoft.com/office/drawing/2010/main" val="0"/>
+              </a:ext>
+            </a:extLst>
+          </a:blip>
+          <a:stretch>
+            <a:fillRect/>
+          </a:stretch>
+        </p:blipFill>
+        <p:spPr>
+          <a:xfrm>
+            <a:off x="789139" y="1403985"/>
+            <a:ext cx="10546915" cy="4829175"/>
+          </a:xfrm>
+        </p:spPr>
+      </p:pic>
+      <p:sp>
+        <p:nvSpPr>
+          <p:cNvPr id="8" name="Frame 7"/>
+          <p:cNvSpPr/>
+          <p:nvPr/>
+        </p:nvSpPr>
+        <p:spPr>
+          <a:xfrm>
+            <a:off x="1935480" y="3093720"/>
+            <a:ext cx="5471160" cy="426720"/>
+          </a:xfrm>
+          <a:prstGeom prst="frame">
+            <a:avLst/>
+          </a:prstGeom>
+          <a:solidFill>
+            <a:srgbClr val="FF0000"/>
+          </a:solidFill>
+          <a:ln>
+            <a:solidFill>
+              <a:srgbClr val="FF0000"/>
+            </a:solidFill>
+          </a:ln>
+        </p:spPr>
+        <p:style>
+          <a:lnRef idx="2">
+            <a:schemeClr val="accent1">
+              <a:shade val="50000"/>
+            </a:schemeClr>
+          </a:lnRef>
+          <a:fillRef idx="1">
+            <a:schemeClr val="accent1"/>
+          </a:fillRef>
+          <a:effectRef idx="0">
+            <a:schemeClr val="accent1"/>
+          </a:effectRef>
+          <a:fontRef idx="minor">
+            <a:schemeClr val="lt1"/>
+          </a:fontRef>
+        </p:style>
+        <p:txBody>
+          <a:bodyPr rtlCol="0" anchor="ctr"/>
+          <a:lstStyle/>
+          <a:p>
+            <a:pPr algn="ctr"/>
+            <a:endParaRPr lang="en-US">
+              <a:solidFill>
+                <a:schemeClr val="tx1"/>
+              </a:solidFill>
+            </a:endParaRPr>
+          </a:p>
+        </p:txBody>
+      </p:sp>
+    </p:spTree>
+    <p:extLst>
+      <p:ext uri="{BB962C8B-B14F-4D97-AF65-F5344CB8AC3E}">
+        <p14:creationId xmlns:p14="http://schemas.microsoft.com/office/powerpoint/2010/main" val="1994693897"/>
+      </p:ext>
+    </p:extLst>
+  </p:cSld>
+  <p:clrMapOvr>
+    <a:masterClrMapping/>
+  </p:clrMapOvr>
+  <mc:AlternateContent xmlns:mc="http://schemas.openxmlformats.org/markup-compatibility/2006" xmlns:p14="http://schemas.microsoft.com/office/powerpoint/2010/main">
+    <mc:Choice Requires="p14">
+      <p:transition spd="slow" p14:dur="2000" advTm="9435"/>
+    </mc:Choice>
+    <mc:Fallback xmlns="">
+      <p:transition spd="slow" advTm="9435"/>
+    </mc:Fallback>
+  </mc:AlternateContent>
+  <p:timing>
+    <p:tnLst>
+      <p:par>
+        <p:cTn id="1" dur="indefinite" restart="never" nodeType="tmRoot"/>
+      </p:par>
+    </p:tnLst>
+  </p:timing>
+</p:sld>
+</file>
+
+<file path=ppt/slides/slide14.xml><?xml version="1.0" encoding="utf-8"?>
+<p:sld xmlns:a="http://schemas.openxmlformats.org/drawingml/2006/main" xmlns:r="http://schemas.openxmlformats.org/officeDocument/2006/relationships" xmlns:p="http://schemas.openxmlformats.org/presentationml/2006/main">
+  <p:cSld>
+    <p:spTree>
+      <p:nvGrpSpPr>
+        <p:cNvPr id="1" name=""/>
+        <p:cNvGrpSpPr/>
+        <p:nvPr/>
+      </p:nvGrpSpPr>
+      <p:grpSpPr>
+        <a:xfrm>
+          <a:off x="0" y="0"/>
+          <a:ext cx="0" cy="0"/>
+          <a:chOff x="0" y="0"/>
+          <a:chExt cx="0" cy="0"/>
+        </a:xfrm>
+      </p:grpSpPr>
+      <p:sp>
+        <p:nvSpPr>
+          <p:cNvPr id="2" name="Title 1"/>
+          <p:cNvSpPr>
+            <a:spLocks noGrp="1"/>
+          </p:cNvSpPr>
+          <p:nvPr>
+            <p:ph type="title"/>
+          </p:nvPr>
+        </p:nvSpPr>
+        <p:spPr>
+          <a:xfrm>
+            <a:off x="789139" y="438599"/>
+            <a:ext cx="10546915" cy="638640"/>
+          </a:xfrm>
+          <a:solidFill>
+            <a:schemeClr val="bg2">
+              <a:lumMod val="75000"/>
+            </a:schemeClr>
+          </a:solidFill>
+        </p:spPr>
+        <p:txBody>
+          <a:bodyPr>
+            <a:normAutofit fontScale="90000"/>
+          </a:bodyPr>
+          <a:lstStyle/>
+          <a:p>
+            <a:r>
+              <a:rPr lang="en-US" b="1" cap="none" dirty="0" smtClean="0">
+                <a:latin typeface="Arial" charset="0"/>
+                <a:ea typeface="Arial" charset="0"/>
+                <a:cs typeface="Arial" charset="0"/>
+              </a:rPr>
+              <a:t>Improvements</a:t>
+            </a:r>
+            <a:endParaRPr lang="en-US" b="1" cap="none" dirty="0">
+              <a:latin typeface="Arial" charset="0"/>
+              <a:ea typeface="Arial" charset="0"/>
+              <a:cs typeface="Arial" charset="0"/>
+            </a:endParaRPr>
+          </a:p>
+        </p:txBody>
+      </p:sp>
+      <p:sp>
+        <p:nvSpPr>
+          <p:cNvPr id="5" name="Content Placeholder 4"/>
+          <p:cNvSpPr>
+            <a:spLocks noGrp="1"/>
+          </p:cNvSpPr>
+          <p:nvPr>
+            <p:ph idx="1"/>
+          </p:nvPr>
+        </p:nvSpPr>
+        <p:spPr>
+          <a:xfrm>
+            <a:off x="789139" y="1642534"/>
+            <a:ext cx="10546915" cy="4773506"/>
+          </a:xfrm>
+        </p:spPr>
+        <p:txBody>
+          <a:bodyPr>
+            <a:normAutofit/>
+          </a:bodyPr>
+          <a:lstStyle/>
+          <a:p>
+            <a:r>
+              <a:rPr lang="en-US" sz="3200" dirty="0" smtClean="0">
+                <a:ea typeface="Calibri" charset="0"/>
+                <a:cs typeface="Calibri" charset="0"/>
+              </a:rPr>
+              <a:t>Helper methods (converting pounds/pence &amp; pence/pounds) are duplicated in two models </a:t>
+            </a:r>
+            <a:r>
+              <a:rPr lang="mr-IN" sz="3200" dirty="0" smtClean="0">
+                <a:ea typeface="Calibri" charset="0"/>
+                <a:cs typeface="Calibri" charset="0"/>
+              </a:rPr>
+              <a:t>–</a:t>
+            </a:r>
+            <a:r>
+              <a:rPr lang="en-US" sz="3200" dirty="0" smtClean="0">
+                <a:ea typeface="Calibri" charset="0"/>
+                <a:cs typeface="Calibri" charset="0"/>
+              </a:rPr>
+              <a:t> need to refactor to move them into a separate helper class</a:t>
+            </a:r>
+          </a:p>
+          <a:p>
+            <a:r>
+              <a:rPr lang="en-US" sz="3200" dirty="0" smtClean="0">
+                <a:ea typeface="Calibri" charset="0"/>
+                <a:cs typeface="Calibri" charset="0"/>
+              </a:rPr>
+              <a:t>Need to improve how </a:t>
+            </a:r>
+            <a:r>
+              <a:rPr lang="en-US" sz="3200" dirty="0" smtClean="0">
+                <a:ea typeface="Calibri" charset="0"/>
+                <a:cs typeface="Calibri" charset="0"/>
+              </a:rPr>
+              <a:t>the website </a:t>
+            </a:r>
+            <a:r>
+              <a:rPr lang="en-US" sz="3200" dirty="0" smtClean="0">
+                <a:ea typeface="Calibri" charset="0"/>
+                <a:cs typeface="Calibri" charset="0"/>
+              </a:rPr>
+              <a:t>responds to resizing the </a:t>
+            </a:r>
+            <a:r>
+              <a:rPr lang="en-US" sz="3200" dirty="0" smtClean="0">
+                <a:ea typeface="Calibri" charset="0"/>
+                <a:cs typeface="Calibri" charset="0"/>
+              </a:rPr>
+              <a:t>browser</a:t>
+            </a:r>
+          </a:p>
+          <a:p>
+            <a:r>
+              <a:rPr lang="en-US" sz="3200" dirty="0" smtClean="0">
+                <a:ea typeface="Calibri" charset="0"/>
+                <a:cs typeface="Calibri" charset="0"/>
+              </a:rPr>
+              <a:t>Add multiple budgets</a:t>
+            </a:r>
+          </a:p>
+          <a:p>
+            <a:r>
+              <a:rPr lang="en-US" sz="3200" dirty="0" smtClean="0">
+                <a:ea typeface="Calibri" charset="0"/>
+                <a:cs typeface="Calibri" charset="0"/>
+              </a:rPr>
+              <a:t>Add accounts</a:t>
+            </a:r>
+            <a:endParaRPr lang="en-US" sz="3200" dirty="0" smtClean="0">
+              <a:ea typeface="Calibri" charset="0"/>
+              <a:cs typeface="Calibri" charset="0"/>
+            </a:endParaRPr>
+          </a:p>
+          <a:p>
+            <a:pPr marL="685800" lvl="3" indent="0">
+              <a:buNone/>
+            </a:pPr>
+            <a:endParaRPr lang="en-US" sz="2200" dirty="0">
+              <a:latin typeface="Consolas" charset="0"/>
+              <a:ea typeface="Consolas" charset="0"/>
+              <a:cs typeface="Consolas" charset="0"/>
+            </a:endParaRPr>
+          </a:p>
+          <a:p>
+            <a:pPr lvl="3"/>
+            <a:endParaRPr lang="en-US" sz="2200" dirty="0"/>
+          </a:p>
+        </p:txBody>
+      </p:sp>
+    </p:spTree>
+    <p:extLst>
+      <p:ext uri="{BB962C8B-B14F-4D97-AF65-F5344CB8AC3E}">
+        <p14:creationId xmlns:p14="http://schemas.microsoft.com/office/powerpoint/2010/main" val="601805691"/>
+      </p:ext>
+    </p:extLst>
+  </p:cSld>
+  <p:clrMapOvr>
+    <a:masterClrMapping/>
+  </p:clrMapOvr>
+  <mc:AlternateContent xmlns:mc="http://schemas.openxmlformats.org/markup-compatibility/2006" xmlns:p14="http://schemas.microsoft.com/office/powerpoint/2010/main">
+    <mc:Choice Requires="p14">
+      <p:transition spd="slow" p14:dur="2000" advTm="29884"/>
+    </mc:Choice>
+    <mc:Fallback xmlns="">
+      <p:transition spd="slow" advTm="29884"/>
+    </mc:Fallback>
+  </mc:AlternateContent>
+  <p:timing>
+    <p:tnLst>
+      <p:par>
+        <p:cTn id="1" dur="indefinite" restart="never" nodeType="tmRoot"/>
+      </p:par>
+    </p:tnLst>
+  </p:timing>
+</p:sld>
+</file>
+
+<file path=ppt/slides/slide15.xml><?xml version="1.0" encoding="utf-8"?>
+<p:sld xmlns:a="http://schemas.openxmlformats.org/drawingml/2006/main" xmlns:r="http://schemas.openxmlformats.org/officeDocument/2006/relationships" xmlns:p="http://schemas.openxmlformats.org/presentationml/2006/main">
+  <p:cSld>
+    <p:spTree>
+      <p:nvGrpSpPr>
+        <p:cNvPr id="1" name=""/>
+        <p:cNvGrpSpPr/>
+        <p:nvPr/>
+      </p:nvGrpSpPr>
+      <p:grpSpPr>
+        <a:xfrm>
+          <a:off x="0" y="0"/>
+          <a:ext cx="0" cy="0"/>
+          <a:chOff x="0" y="0"/>
+          <a:chExt cx="0" cy="0"/>
+        </a:xfrm>
+      </p:grpSpPr>
+      <p:sp>
+        <p:nvSpPr>
+          <p:cNvPr id="2" name="Title 1"/>
+          <p:cNvSpPr>
+            <a:spLocks noGrp="1"/>
+          </p:cNvSpPr>
+          <p:nvPr>
+            <p:ph type="title"/>
+          </p:nvPr>
+        </p:nvSpPr>
+        <p:spPr>
+          <a:xfrm>
+            <a:off x="789139" y="438599"/>
+            <a:ext cx="10546915" cy="638640"/>
+          </a:xfrm>
+          <a:solidFill>
+            <a:schemeClr val="bg2">
+              <a:lumMod val="75000"/>
+            </a:schemeClr>
+          </a:solidFill>
+        </p:spPr>
+        <p:txBody>
+          <a:bodyPr>
+            <a:normAutofit fontScale="90000"/>
+          </a:bodyPr>
+          <a:lstStyle/>
+          <a:p>
+            <a:r>
+              <a:rPr lang="en-US" b="1" cap="none" dirty="0" smtClean="0">
+                <a:latin typeface="Arial" charset="0"/>
+                <a:ea typeface="Arial" charset="0"/>
+                <a:cs typeface="Arial" charset="0"/>
+              </a:rPr>
+              <a:t>Learning Points</a:t>
+            </a:r>
+            <a:endParaRPr lang="en-US" b="1" cap="none" dirty="0">
+              <a:latin typeface="Arial" charset="0"/>
+              <a:ea typeface="Arial" charset="0"/>
+              <a:cs typeface="Arial" charset="0"/>
+            </a:endParaRPr>
+          </a:p>
+        </p:txBody>
+      </p:sp>
+      <p:sp>
+        <p:nvSpPr>
+          <p:cNvPr id="5" name="Content Placeholder 4"/>
+          <p:cNvSpPr>
+            <a:spLocks noGrp="1"/>
+          </p:cNvSpPr>
+          <p:nvPr>
+            <p:ph idx="1"/>
+          </p:nvPr>
+        </p:nvSpPr>
+        <p:spPr>
+          <a:xfrm>
+            <a:off x="789139" y="1642534"/>
+            <a:ext cx="10546915" cy="4773506"/>
+          </a:xfrm>
+        </p:spPr>
+        <p:txBody>
+          <a:bodyPr>
+            <a:normAutofit fontScale="92500" lnSpcReduction="10000"/>
+          </a:bodyPr>
+          <a:lstStyle/>
+          <a:p>
+            <a:r>
+              <a:rPr lang="en-US" sz="3200" dirty="0" smtClean="0"/>
+              <a:t>Planning is key</a:t>
+            </a:r>
+          </a:p>
+          <a:p>
+            <a:pPr lvl="1"/>
+            <a:r>
+              <a:rPr lang="en-US" sz="2800" dirty="0" smtClean="0"/>
+              <a:t>Planning the models, methods, controllers, views etc.</a:t>
+            </a:r>
+          </a:p>
+          <a:p>
+            <a:pPr lvl="1"/>
+            <a:r>
+              <a:rPr lang="en-US" sz="2800" dirty="0" smtClean="0"/>
+              <a:t>Having a clear vision of what the app should look like in the </a:t>
+            </a:r>
+            <a:r>
+              <a:rPr lang="en-US" sz="2800" dirty="0" smtClean="0"/>
+              <a:t>UI</a:t>
+            </a:r>
+          </a:p>
+          <a:p>
+            <a:r>
+              <a:rPr lang="en-US" sz="3000" dirty="0" smtClean="0"/>
+              <a:t>I need to get more outside </a:t>
+            </a:r>
+            <a:r>
+              <a:rPr lang="en-US" sz="3000" smtClean="0"/>
+              <a:t>my comfort zone in the next project (focus more on back end code)</a:t>
+            </a:r>
+            <a:endParaRPr lang="en-US" sz="3000" dirty="0" smtClean="0"/>
+          </a:p>
+          <a:p>
+            <a:r>
+              <a:rPr lang="en-US" sz="3200" dirty="0" smtClean="0"/>
+              <a:t>Sinatra is picky about ( ) in </a:t>
+            </a:r>
+            <a:r>
+              <a:rPr lang="en-US" sz="3200" dirty="0" err="1" smtClean="0"/>
+              <a:t>erb</a:t>
+            </a:r>
+            <a:r>
+              <a:rPr lang="en-US" sz="3200" dirty="0" smtClean="0"/>
+              <a:t> tags.</a:t>
+            </a:r>
+          </a:p>
+          <a:p>
+            <a:pPr lvl="1"/>
+            <a:r>
+              <a:rPr lang="en-US" sz="2400" dirty="0" smtClean="0"/>
+              <a:t>This works:</a:t>
+            </a:r>
+          </a:p>
+          <a:p>
+            <a:pPr marL="685800" lvl="3" indent="0">
+              <a:buNone/>
+            </a:pPr>
+            <a:r>
+              <a:rPr lang="en-US" sz="2200" dirty="0" smtClean="0"/>
+              <a:t>	</a:t>
+            </a:r>
+            <a:r>
+              <a:rPr lang="en-US" sz="2200" dirty="0" smtClean="0">
+                <a:latin typeface="Consolas" charset="0"/>
+                <a:ea typeface="Consolas" charset="0"/>
+                <a:cs typeface="Consolas" charset="0"/>
+              </a:rPr>
+              <a:t>&lt;%= (</a:t>
+            </a:r>
+            <a:r>
+              <a:rPr lang="en-US" sz="2200" dirty="0" err="1" smtClean="0">
+                <a:latin typeface="Consolas" charset="0"/>
+                <a:ea typeface="Consolas" charset="0"/>
+                <a:cs typeface="Consolas" charset="0"/>
+              </a:rPr>
+              <a:t>Transaction.total.to_f</a:t>
+            </a:r>
+            <a:r>
+              <a:rPr lang="en-US" sz="2200" dirty="0" smtClean="0">
+                <a:latin typeface="Consolas" charset="0"/>
+                <a:ea typeface="Consolas" charset="0"/>
+                <a:cs typeface="Consolas" charset="0"/>
+              </a:rPr>
+              <a:t>() /100) %&gt;</a:t>
+            </a:r>
+          </a:p>
+          <a:p>
+            <a:pPr lvl="1"/>
+            <a:r>
+              <a:rPr lang="en-US" sz="2400" dirty="0" smtClean="0"/>
+              <a:t>This doesn’t!:</a:t>
+            </a:r>
+          </a:p>
+          <a:p>
+            <a:pPr marL="685800" lvl="3" indent="0">
+              <a:buNone/>
+            </a:pPr>
+            <a:r>
+              <a:rPr lang="en-US" sz="2200" dirty="0" smtClean="0"/>
+              <a:t> 	</a:t>
+            </a:r>
+            <a:r>
+              <a:rPr lang="en-US" sz="2200" dirty="0" smtClean="0">
+                <a:latin typeface="Consolas" charset="0"/>
+                <a:ea typeface="Consolas" charset="0"/>
+                <a:cs typeface="Consolas" charset="0"/>
+              </a:rPr>
+              <a:t>&lt;%= </a:t>
+            </a:r>
+            <a:r>
+              <a:rPr lang="en-US" sz="2200" dirty="0">
+                <a:latin typeface="Consolas" charset="0"/>
+                <a:ea typeface="Consolas" charset="0"/>
+                <a:cs typeface="Consolas" charset="0"/>
+              </a:rPr>
+              <a:t>(</a:t>
+            </a:r>
+            <a:r>
+              <a:rPr lang="en-US" sz="2200" dirty="0" err="1" smtClean="0">
+                <a:latin typeface="Consolas" charset="0"/>
+                <a:ea typeface="Consolas" charset="0"/>
+                <a:cs typeface="Consolas" charset="0"/>
+              </a:rPr>
+              <a:t>Transaction.total.to_f</a:t>
+            </a:r>
+            <a:r>
+              <a:rPr lang="en-US" sz="2200" dirty="0" smtClean="0">
+                <a:latin typeface="Consolas" charset="0"/>
+                <a:ea typeface="Consolas" charset="0"/>
+                <a:cs typeface="Consolas" charset="0"/>
+              </a:rPr>
+              <a:t> </a:t>
+            </a:r>
+            <a:r>
+              <a:rPr lang="en-US" sz="2200" dirty="0">
+                <a:latin typeface="Consolas" charset="0"/>
+                <a:ea typeface="Consolas" charset="0"/>
+                <a:cs typeface="Consolas" charset="0"/>
+              </a:rPr>
+              <a:t>/100) </a:t>
+            </a:r>
+            <a:r>
+              <a:rPr lang="en-US" sz="2200" dirty="0" smtClean="0">
+                <a:latin typeface="Consolas" charset="0"/>
+                <a:ea typeface="Consolas" charset="0"/>
+                <a:cs typeface="Consolas" charset="0"/>
+              </a:rPr>
+              <a:t>%&gt;</a:t>
+            </a:r>
+          </a:p>
+          <a:p>
+            <a:pPr marL="685800" lvl="3" indent="0">
+              <a:buNone/>
+            </a:pPr>
+            <a:endParaRPr lang="en-US" sz="2200" dirty="0">
+              <a:latin typeface="Consolas" charset="0"/>
+              <a:ea typeface="Consolas" charset="0"/>
+              <a:cs typeface="Consolas" charset="0"/>
+            </a:endParaRPr>
+          </a:p>
+          <a:p>
+            <a:pPr lvl="3"/>
+            <a:endParaRPr lang="en-US" sz="2200" dirty="0"/>
+          </a:p>
+        </p:txBody>
+      </p:sp>
+    </p:spTree>
+    <p:extLst>
+      <p:ext uri="{BB962C8B-B14F-4D97-AF65-F5344CB8AC3E}">
+        <p14:creationId xmlns:p14="http://schemas.microsoft.com/office/powerpoint/2010/main" val="108158784"/>
+      </p:ext>
+    </p:extLst>
+  </p:cSld>
+  <p:clrMapOvr>
+    <a:masterClrMapping/>
+  </p:clrMapOvr>
+  <mc:AlternateContent xmlns:mc="http://schemas.openxmlformats.org/markup-compatibility/2006" xmlns:p14="http://schemas.microsoft.com/office/powerpoint/2010/main">
+    <mc:Choice Requires="p14">
+      <p:transition spd="slow" p14:dur="2000" advTm="80304"/>
+    </mc:Choice>
+    <mc:Fallback xmlns="">
+      <p:transition spd="slow" advTm="80304"/>
+    </mc:Fallback>
+  </mc:AlternateContent>
+  <p:timing>
+    <p:tnLst>
+      <p:par>
+        <p:cTn id="1" dur="indefinite" restart="never" nodeType="tmRoot"/>
+      </p:par>
+    </p:tnLst>
+  </p:timing>
+</p:sld>
+</file>
+
+<file path=ppt/slides/slide2.xml><?xml version="1.0" encoding="utf-8"?>
+<p:sld xmlns:a="http://schemas.openxmlformats.org/drawingml/2006/main" xmlns:r="http://schemas.openxmlformats.org/officeDocument/2006/relationships" xmlns:p="http://schemas.openxmlformats.org/presentationml/2006/main">
+  <p:cSld>
+    <p:spTree>
+      <p:nvGrpSpPr>
+        <p:cNvPr id="1" name=""/>
+        <p:cNvGrpSpPr/>
+        <p:nvPr/>
+      </p:nvGrpSpPr>
+      <p:grpSpPr>
+        <a:xfrm>
+          <a:off x="0" y="0"/>
+          <a:ext cx="0" cy="0"/>
+          <a:chOff x="0" y="0"/>
+          <a:chExt cx="0" cy="0"/>
+        </a:xfrm>
+      </p:grpSpPr>
+      <p:sp>
+        <p:nvSpPr>
+          <p:cNvPr id="2" name="Title 1"/>
+          <p:cNvSpPr>
+            <a:spLocks noGrp="1"/>
+          </p:cNvSpPr>
+          <p:nvPr>
             <p:ph type="ctrTitle"/>
           </p:nvPr>
         </p:nvSpPr>
@@ -4676,1302 +5994,12 @@
   <p:clrMapOvr>
     <a:masterClrMapping/>
   </p:clrMapOvr>
-  <mc:AlternateContent xmlns:mc="http://schemas.openxmlformats.org/markup-compatibility/2006">
-    <mc:Choice xmlns:p14="http://schemas.microsoft.com/office/powerpoint/2010/main" Requires="p14">
+  <mc:AlternateContent xmlns:mc="http://schemas.openxmlformats.org/markup-compatibility/2006" xmlns:p14="http://schemas.microsoft.com/office/powerpoint/2010/main">
+    <mc:Choice Requires="p14">
       <p:transition spd="slow" p14:dur="2000" advTm="23209"/>
     </mc:Choice>
-    <mc:Fallback>
+    <mc:Fallback xmlns="">
       <p:transition spd="slow" advTm="23209"/>
-    </mc:Fallback>
-  </mc:AlternateContent>
-  <p:timing>
-    <p:tnLst>
-      <p:par>
-        <p:cTn id="1" dur="indefinite" restart="never" nodeType="tmRoot"/>
-      </p:par>
-    </p:tnLst>
-  </p:timing>
-</p:sld>
-</file>
-
-<file path=ppt/slides/slide10.xml><?xml version="1.0" encoding="utf-8"?>
-<p:sld xmlns:a="http://schemas.openxmlformats.org/drawingml/2006/main" xmlns:r="http://schemas.openxmlformats.org/officeDocument/2006/relationships" xmlns:p="http://schemas.openxmlformats.org/presentationml/2006/main">
-  <p:cSld>
-    <p:spTree>
-      <p:nvGrpSpPr>
-        <p:cNvPr id="1" name=""/>
-        <p:cNvGrpSpPr/>
-        <p:nvPr/>
-      </p:nvGrpSpPr>
-      <p:grpSpPr>
-        <a:xfrm>
-          <a:off x="0" y="0"/>
-          <a:ext cx="0" cy="0"/>
-          <a:chOff x="0" y="0"/>
-          <a:chExt cx="0" cy="0"/>
-        </a:xfrm>
-      </p:grpSpPr>
-      <p:sp>
-        <p:nvSpPr>
-          <p:cNvPr id="2" name="Title 1"/>
-          <p:cNvSpPr>
-            <a:spLocks noGrp="1"/>
-          </p:cNvSpPr>
-          <p:nvPr>
-            <p:ph type="title"/>
-          </p:nvPr>
-        </p:nvSpPr>
-        <p:spPr>
-          <a:xfrm>
-            <a:off x="789139" y="438599"/>
-            <a:ext cx="10546915" cy="638640"/>
-          </a:xfrm>
-          <a:solidFill>
-            <a:schemeClr val="bg2">
-              <a:lumMod val="75000"/>
-            </a:schemeClr>
-          </a:solidFill>
-        </p:spPr>
-        <p:txBody>
-          <a:bodyPr>
-            <a:normAutofit fontScale="90000"/>
-          </a:bodyPr>
-          <a:lstStyle/>
-          <a:p>
-            <a:r>
-              <a:rPr lang="en-US" b="1" cap="none" dirty="0" smtClean="0">
-                <a:latin typeface="Arial" charset="0"/>
-                <a:ea typeface="Arial" charset="0"/>
-                <a:cs typeface="Arial" charset="0"/>
-              </a:rPr>
-              <a:t>Explain Code </a:t>
-            </a:r>
-            <a:r>
-              <a:rPr lang="mr-IN" b="1" cap="none" dirty="0" smtClean="0">
-                <a:latin typeface="Arial" charset="0"/>
-                <a:ea typeface="Arial" charset="0"/>
-                <a:cs typeface="Arial" charset="0"/>
-              </a:rPr>
-              <a:t>–</a:t>
-            </a:r>
-            <a:r>
-              <a:rPr lang="en-US" b="1" cap="none" dirty="0" smtClean="0">
-                <a:latin typeface="Arial" charset="0"/>
-                <a:ea typeface="Arial" charset="0"/>
-                <a:cs typeface="Arial" charset="0"/>
-              </a:rPr>
-              <a:t> Amount Conversion - Save</a:t>
-            </a:r>
-            <a:endParaRPr lang="en-US" b="1" cap="none" dirty="0">
-              <a:latin typeface="Arial" charset="0"/>
-              <a:ea typeface="Arial" charset="0"/>
-              <a:cs typeface="Arial" charset="0"/>
-            </a:endParaRPr>
-          </a:p>
-        </p:txBody>
-      </p:sp>
-      <p:pic>
-        <p:nvPicPr>
-          <p:cNvPr id="5" name="Content Placeholder 4"/>
-          <p:cNvPicPr>
-            <a:picLocks noGrp="1" noChangeAspect="1"/>
-          </p:cNvPicPr>
-          <p:nvPr>
-            <p:ph idx="1"/>
-          </p:nvPr>
-        </p:nvPicPr>
-        <p:blipFill>
-          <a:blip r:embed="rId3">
-            <a:extLst>
-              <a:ext uri="{28A0092B-C50C-407E-A947-70E740481C1C}">
-                <a14:useLocalDpi xmlns:a14="http://schemas.microsoft.com/office/drawing/2010/main" val="0"/>
-              </a:ext>
-            </a:extLst>
-          </a:blip>
-          <a:stretch>
-            <a:fillRect/>
-          </a:stretch>
-        </p:blipFill>
-        <p:spPr>
-          <a:xfrm>
-            <a:off x="789139" y="1403985"/>
-            <a:ext cx="10546915" cy="4981575"/>
-          </a:xfrm>
-        </p:spPr>
-      </p:pic>
-      <p:sp>
-        <p:nvSpPr>
-          <p:cNvPr id="6" name="Frame 5"/>
-          <p:cNvSpPr/>
-          <p:nvPr/>
-        </p:nvSpPr>
-        <p:spPr>
-          <a:xfrm>
-            <a:off x="2057400" y="2545080"/>
-            <a:ext cx="5608320" cy="487680"/>
-          </a:xfrm>
-          <a:prstGeom prst="frame">
-            <a:avLst/>
-          </a:prstGeom>
-          <a:solidFill>
-            <a:srgbClr val="FF0000"/>
-          </a:solidFill>
-          <a:ln>
-            <a:solidFill>
-              <a:srgbClr val="FF0000"/>
-            </a:solidFill>
-          </a:ln>
-        </p:spPr>
-        <p:style>
-          <a:lnRef idx="2">
-            <a:schemeClr val="accent1">
-              <a:shade val="50000"/>
-            </a:schemeClr>
-          </a:lnRef>
-          <a:fillRef idx="1">
-            <a:schemeClr val="accent1"/>
-          </a:fillRef>
-          <a:effectRef idx="0">
-            <a:schemeClr val="accent1"/>
-          </a:effectRef>
-          <a:fontRef idx="minor">
-            <a:schemeClr val="lt1"/>
-          </a:fontRef>
-        </p:style>
-        <p:txBody>
-          <a:bodyPr rtlCol="0" anchor="ctr"/>
-          <a:lstStyle/>
-          <a:p>
-            <a:pPr algn="ctr"/>
-            <a:endParaRPr lang="en-US">
-              <a:solidFill>
-                <a:schemeClr val="tx1"/>
-              </a:solidFill>
-            </a:endParaRPr>
-          </a:p>
-        </p:txBody>
-      </p:sp>
-    </p:spTree>
-    <p:extLst>
-      <p:ext uri="{BB962C8B-B14F-4D97-AF65-F5344CB8AC3E}">
-        <p14:creationId xmlns:p14="http://schemas.microsoft.com/office/powerpoint/2010/main" val="1288216416"/>
-      </p:ext>
-    </p:extLst>
-  </p:cSld>
-  <p:clrMapOvr>
-    <a:masterClrMapping/>
-  </p:clrMapOvr>
-  <mc:AlternateContent xmlns:mc="http://schemas.openxmlformats.org/markup-compatibility/2006">
-    <mc:Choice xmlns:p14="http://schemas.microsoft.com/office/powerpoint/2010/main" Requires="p14">
-      <p:transition spd="slow" p14:dur="2000" advTm="20096"/>
-    </mc:Choice>
-    <mc:Fallback>
-      <p:transition spd="slow" advTm="20096"/>
-    </mc:Fallback>
-  </mc:AlternateContent>
-  <p:timing>
-    <p:tnLst>
-      <p:par>
-        <p:cTn id="1" dur="indefinite" restart="never" nodeType="tmRoot"/>
-      </p:par>
-    </p:tnLst>
-  </p:timing>
-</p:sld>
-</file>
-
-<file path=ppt/slides/slide11.xml><?xml version="1.0" encoding="utf-8"?>
-<p:sld xmlns:a="http://schemas.openxmlformats.org/drawingml/2006/main" xmlns:r="http://schemas.openxmlformats.org/officeDocument/2006/relationships" xmlns:p="http://schemas.openxmlformats.org/presentationml/2006/main">
-  <p:cSld>
-    <p:spTree>
-      <p:nvGrpSpPr>
-        <p:cNvPr id="1" name=""/>
-        <p:cNvGrpSpPr/>
-        <p:nvPr/>
-      </p:nvGrpSpPr>
-      <p:grpSpPr>
-        <a:xfrm>
-          <a:off x="0" y="0"/>
-          <a:ext cx="0" cy="0"/>
-          <a:chOff x="0" y="0"/>
-          <a:chExt cx="0" cy="0"/>
-        </a:xfrm>
-      </p:grpSpPr>
-      <p:sp>
-        <p:nvSpPr>
-          <p:cNvPr id="2" name="Title 1"/>
-          <p:cNvSpPr>
-            <a:spLocks noGrp="1"/>
-          </p:cNvSpPr>
-          <p:nvPr>
-            <p:ph type="title"/>
-          </p:nvPr>
-        </p:nvSpPr>
-        <p:spPr>
-          <a:xfrm>
-            <a:off x="789139" y="438599"/>
-            <a:ext cx="10546915" cy="638640"/>
-          </a:xfrm>
-          <a:solidFill>
-            <a:schemeClr val="bg2">
-              <a:lumMod val="75000"/>
-            </a:schemeClr>
-          </a:solidFill>
-        </p:spPr>
-        <p:txBody>
-          <a:bodyPr>
-            <a:normAutofit fontScale="90000"/>
-          </a:bodyPr>
-          <a:lstStyle/>
-          <a:p>
-            <a:r>
-              <a:rPr lang="en-US" b="1" cap="none" dirty="0" smtClean="0">
-                <a:latin typeface="Arial" charset="0"/>
-                <a:ea typeface="Arial" charset="0"/>
-                <a:cs typeface="Arial" charset="0"/>
-              </a:rPr>
-              <a:t>Explain Code </a:t>
-            </a:r>
-            <a:r>
-              <a:rPr lang="mr-IN" b="1" cap="none" dirty="0" smtClean="0">
-                <a:latin typeface="Arial" charset="0"/>
-                <a:ea typeface="Arial" charset="0"/>
-                <a:cs typeface="Arial" charset="0"/>
-              </a:rPr>
-              <a:t>–</a:t>
-            </a:r>
-            <a:r>
-              <a:rPr lang="en-US" b="1" cap="none" dirty="0" smtClean="0">
-                <a:latin typeface="Arial" charset="0"/>
-                <a:ea typeface="Arial" charset="0"/>
-                <a:cs typeface="Arial" charset="0"/>
-              </a:rPr>
-              <a:t> Amount Conversion - View</a:t>
-            </a:r>
-            <a:endParaRPr lang="en-US" b="1" cap="none" dirty="0">
-              <a:latin typeface="Arial" charset="0"/>
-              <a:ea typeface="Arial" charset="0"/>
-              <a:cs typeface="Arial" charset="0"/>
-            </a:endParaRPr>
-          </a:p>
-        </p:txBody>
-      </p:sp>
-      <p:pic>
-        <p:nvPicPr>
-          <p:cNvPr id="7" name="Content Placeholder 6"/>
-          <p:cNvPicPr>
-            <a:picLocks noGrp="1" noChangeAspect="1"/>
-          </p:cNvPicPr>
-          <p:nvPr>
-            <p:ph idx="1"/>
-          </p:nvPr>
-        </p:nvPicPr>
-        <p:blipFill>
-          <a:blip r:embed="rId3">
-            <a:extLst>
-              <a:ext uri="{28A0092B-C50C-407E-A947-70E740481C1C}">
-                <a14:useLocalDpi xmlns:a14="http://schemas.microsoft.com/office/drawing/2010/main" val="0"/>
-              </a:ext>
-            </a:extLst>
-          </a:blip>
-          <a:stretch>
-            <a:fillRect/>
-          </a:stretch>
-        </p:blipFill>
-        <p:spPr>
-          <a:xfrm>
-            <a:off x="789139" y="1403985"/>
-            <a:ext cx="10546915" cy="4829175"/>
-          </a:xfrm>
-        </p:spPr>
-      </p:pic>
-      <p:sp>
-        <p:nvSpPr>
-          <p:cNvPr id="8" name="Frame 7"/>
-          <p:cNvSpPr/>
-          <p:nvPr/>
-        </p:nvSpPr>
-        <p:spPr>
-          <a:xfrm>
-            <a:off x="1965960" y="3413760"/>
-            <a:ext cx="7056120" cy="426720"/>
-          </a:xfrm>
-          <a:prstGeom prst="frame">
-            <a:avLst/>
-          </a:prstGeom>
-          <a:solidFill>
-            <a:srgbClr val="FF0000"/>
-          </a:solidFill>
-          <a:ln>
-            <a:solidFill>
-              <a:srgbClr val="FF0000"/>
-            </a:solidFill>
-          </a:ln>
-        </p:spPr>
-        <p:style>
-          <a:lnRef idx="2">
-            <a:schemeClr val="accent1">
-              <a:shade val="50000"/>
-            </a:schemeClr>
-          </a:lnRef>
-          <a:fillRef idx="1">
-            <a:schemeClr val="accent1"/>
-          </a:fillRef>
-          <a:effectRef idx="0">
-            <a:schemeClr val="accent1"/>
-          </a:effectRef>
-          <a:fontRef idx="minor">
-            <a:schemeClr val="lt1"/>
-          </a:fontRef>
-        </p:style>
-        <p:txBody>
-          <a:bodyPr rtlCol="0" anchor="ctr"/>
-          <a:lstStyle/>
-          <a:p>
-            <a:pPr algn="ctr"/>
-            <a:endParaRPr lang="en-US">
-              <a:solidFill>
-                <a:schemeClr val="tx1"/>
-              </a:solidFill>
-            </a:endParaRPr>
-          </a:p>
-        </p:txBody>
-      </p:sp>
-    </p:spTree>
-    <p:extLst>
-      <p:ext uri="{BB962C8B-B14F-4D97-AF65-F5344CB8AC3E}">
-        <p14:creationId xmlns:p14="http://schemas.microsoft.com/office/powerpoint/2010/main" val="309995765"/>
-      </p:ext>
-    </p:extLst>
-  </p:cSld>
-  <p:clrMapOvr>
-    <a:masterClrMapping/>
-  </p:clrMapOvr>
-  <mc:AlternateContent xmlns:mc="http://schemas.openxmlformats.org/markup-compatibility/2006">
-    <mc:Choice xmlns:p14="http://schemas.microsoft.com/office/powerpoint/2010/main" Requires="p14">
-      <p:transition spd="slow" p14:dur="2000" advTm="21362"/>
-    </mc:Choice>
-    <mc:Fallback>
-      <p:transition spd="slow" advTm="21362"/>
-    </mc:Fallback>
-  </mc:AlternateContent>
-  <p:timing>
-    <p:tnLst>
-      <p:par>
-        <p:cTn id="1" dur="indefinite" restart="never" nodeType="tmRoot"/>
-      </p:par>
-    </p:tnLst>
-  </p:timing>
-</p:sld>
-</file>
-
-<file path=ppt/slides/slide12.xml><?xml version="1.0" encoding="utf-8"?>
-<p:sld xmlns:a="http://schemas.openxmlformats.org/drawingml/2006/main" xmlns:r="http://schemas.openxmlformats.org/officeDocument/2006/relationships" xmlns:p="http://schemas.openxmlformats.org/presentationml/2006/main">
-  <p:cSld>
-    <p:spTree>
-      <p:nvGrpSpPr>
-        <p:cNvPr id="1" name=""/>
-        <p:cNvGrpSpPr/>
-        <p:nvPr/>
-      </p:nvGrpSpPr>
-      <p:grpSpPr>
-        <a:xfrm>
-          <a:off x="0" y="0"/>
-          <a:ext cx="0" cy="0"/>
-          <a:chOff x="0" y="0"/>
-          <a:chExt cx="0" cy="0"/>
-        </a:xfrm>
-      </p:grpSpPr>
-      <p:sp>
-        <p:nvSpPr>
-          <p:cNvPr id="2" name="Title 1"/>
-          <p:cNvSpPr>
-            <a:spLocks noGrp="1"/>
-          </p:cNvSpPr>
-          <p:nvPr>
-            <p:ph type="title"/>
-          </p:nvPr>
-        </p:nvSpPr>
-        <p:spPr>
-          <a:xfrm>
-            <a:off x="789139" y="438599"/>
-            <a:ext cx="10546915" cy="638640"/>
-          </a:xfrm>
-          <a:solidFill>
-            <a:schemeClr val="bg2">
-              <a:lumMod val="75000"/>
-            </a:schemeClr>
-          </a:solidFill>
-        </p:spPr>
-        <p:txBody>
-          <a:bodyPr>
-            <a:normAutofit fontScale="90000"/>
-          </a:bodyPr>
-          <a:lstStyle/>
-          <a:p>
-            <a:r>
-              <a:rPr lang="en-US" b="1" cap="none" dirty="0" smtClean="0">
-                <a:latin typeface="Arial" charset="0"/>
-                <a:ea typeface="Arial" charset="0"/>
-                <a:cs typeface="Arial" charset="0"/>
-              </a:rPr>
-              <a:t>Explain Code </a:t>
-            </a:r>
-            <a:r>
-              <a:rPr lang="mr-IN" b="1" cap="none" dirty="0" smtClean="0">
-                <a:latin typeface="Arial" charset="0"/>
-                <a:ea typeface="Arial" charset="0"/>
-                <a:cs typeface="Arial" charset="0"/>
-              </a:rPr>
-              <a:t>–</a:t>
-            </a:r>
-            <a:r>
-              <a:rPr lang="en-US" b="1" cap="none" dirty="0" smtClean="0">
-                <a:latin typeface="Arial" charset="0"/>
-                <a:ea typeface="Arial" charset="0"/>
-                <a:cs typeface="Arial" charset="0"/>
-              </a:rPr>
-              <a:t> Date Conversion - Method</a:t>
-            </a:r>
-            <a:endParaRPr lang="en-US" b="1" cap="none" dirty="0">
-              <a:latin typeface="Arial" charset="0"/>
-              <a:ea typeface="Arial" charset="0"/>
-              <a:cs typeface="Arial" charset="0"/>
-            </a:endParaRPr>
-          </a:p>
-        </p:txBody>
-      </p:sp>
-      <p:pic>
-        <p:nvPicPr>
-          <p:cNvPr id="4" name="Content Placeholder 3"/>
-          <p:cNvPicPr>
-            <a:picLocks noGrp="1" noChangeAspect="1"/>
-          </p:cNvPicPr>
-          <p:nvPr>
-            <p:ph idx="1"/>
-          </p:nvPr>
-        </p:nvPicPr>
-        <p:blipFill>
-          <a:blip r:embed="rId3">
-            <a:extLst>
-              <a:ext uri="{28A0092B-C50C-407E-A947-70E740481C1C}">
-                <a14:useLocalDpi xmlns:a14="http://schemas.microsoft.com/office/drawing/2010/main" val="0"/>
-              </a:ext>
-            </a:extLst>
-          </a:blip>
-          <a:stretch>
-            <a:fillRect/>
-          </a:stretch>
-        </p:blipFill>
-        <p:spPr>
-          <a:xfrm>
-            <a:off x="789139" y="1411922"/>
-            <a:ext cx="10546915" cy="3160078"/>
-          </a:xfrm>
-        </p:spPr>
-      </p:pic>
-    </p:spTree>
-    <p:extLst>
-      <p:ext uri="{BB962C8B-B14F-4D97-AF65-F5344CB8AC3E}">
-        <p14:creationId xmlns:p14="http://schemas.microsoft.com/office/powerpoint/2010/main" val="1374398235"/>
-      </p:ext>
-    </p:extLst>
-  </p:cSld>
-  <p:clrMapOvr>
-    <a:masterClrMapping/>
-  </p:clrMapOvr>
-  <mc:AlternateContent xmlns:mc="http://schemas.openxmlformats.org/markup-compatibility/2006">
-    <mc:Choice xmlns:p14="http://schemas.microsoft.com/office/powerpoint/2010/main" Requires="p14">
-      <p:transition spd="slow" p14:dur="2000" advTm="38322"/>
-    </mc:Choice>
-    <mc:Fallback>
-      <p:transition spd="slow" advTm="38322"/>
-    </mc:Fallback>
-  </mc:AlternateContent>
-  <p:timing>
-    <p:tnLst>
-      <p:par>
-        <p:cTn id="1" dur="indefinite" restart="never" nodeType="tmRoot"/>
-      </p:par>
-    </p:tnLst>
-  </p:timing>
-</p:sld>
-</file>
-
-<file path=ppt/slides/slide13.xml><?xml version="1.0" encoding="utf-8"?>
-<p:sld xmlns:a="http://schemas.openxmlformats.org/drawingml/2006/main" xmlns:r="http://schemas.openxmlformats.org/officeDocument/2006/relationships" xmlns:p="http://schemas.openxmlformats.org/presentationml/2006/main">
-  <p:cSld>
-    <p:spTree>
-      <p:nvGrpSpPr>
-        <p:cNvPr id="1" name=""/>
-        <p:cNvGrpSpPr/>
-        <p:nvPr/>
-      </p:nvGrpSpPr>
-      <p:grpSpPr>
-        <a:xfrm>
-          <a:off x="0" y="0"/>
-          <a:ext cx="0" cy="0"/>
-          <a:chOff x="0" y="0"/>
-          <a:chExt cx="0" cy="0"/>
-        </a:xfrm>
-      </p:grpSpPr>
-      <p:sp>
-        <p:nvSpPr>
-          <p:cNvPr id="2" name="Title 1"/>
-          <p:cNvSpPr>
-            <a:spLocks noGrp="1"/>
-          </p:cNvSpPr>
-          <p:nvPr>
-            <p:ph type="title"/>
-          </p:nvPr>
-        </p:nvSpPr>
-        <p:spPr>
-          <a:xfrm>
-            <a:off x="789139" y="438599"/>
-            <a:ext cx="10546915" cy="638640"/>
-          </a:xfrm>
-          <a:solidFill>
-            <a:schemeClr val="bg2">
-              <a:lumMod val="75000"/>
-            </a:schemeClr>
-          </a:solidFill>
-        </p:spPr>
-        <p:txBody>
-          <a:bodyPr>
-            <a:normAutofit fontScale="90000"/>
-          </a:bodyPr>
-          <a:lstStyle/>
-          <a:p>
-            <a:r>
-              <a:rPr lang="en-US" b="1" cap="none" dirty="0" smtClean="0">
-                <a:latin typeface="Arial" charset="0"/>
-                <a:ea typeface="Arial" charset="0"/>
-                <a:cs typeface="Arial" charset="0"/>
-              </a:rPr>
-              <a:t>Explain Code </a:t>
-            </a:r>
-            <a:r>
-              <a:rPr lang="mr-IN" b="1" cap="none" dirty="0" smtClean="0">
-                <a:latin typeface="Arial" charset="0"/>
-                <a:ea typeface="Arial" charset="0"/>
-                <a:cs typeface="Arial" charset="0"/>
-              </a:rPr>
-              <a:t>–</a:t>
-            </a:r>
-            <a:r>
-              <a:rPr lang="en-US" b="1" cap="none" dirty="0" smtClean="0">
-                <a:latin typeface="Arial" charset="0"/>
-                <a:ea typeface="Arial" charset="0"/>
-                <a:cs typeface="Arial" charset="0"/>
-              </a:rPr>
-              <a:t> Date Conversion - View</a:t>
-            </a:r>
-            <a:endParaRPr lang="en-US" b="1" cap="none" dirty="0">
-              <a:latin typeface="Arial" charset="0"/>
-              <a:ea typeface="Arial" charset="0"/>
-              <a:cs typeface="Arial" charset="0"/>
-            </a:endParaRPr>
-          </a:p>
-        </p:txBody>
-      </p:sp>
-      <p:pic>
-        <p:nvPicPr>
-          <p:cNvPr id="7" name="Content Placeholder 6"/>
-          <p:cNvPicPr>
-            <a:picLocks noGrp="1" noChangeAspect="1"/>
-          </p:cNvPicPr>
-          <p:nvPr>
-            <p:ph idx="1"/>
-          </p:nvPr>
-        </p:nvPicPr>
-        <p:blipFill>
-          <a:blip r:embed="rId3">
-            <a:extLst>
-              <a:ext uri="{28A0092B-C50C-407E-A947-70E740481C1C}">
-                <a14:useLocalDpi xmlns:a14="http://schemas.microsoft.com/office/drawing/2010/main" val="0"/>
-              </a:ext>
-            </a:extLst>
-          </a:blip>
-          <a:stretch>
-            <a:fillRect/>
-          </a:stretch>
-        </p:blipFill>
-        <p:spPr>
-          <a:xfrm>
-            <a:off x="789139" y="1403985"/>
-            <a:ext cx="10546915" cy="4829175"/>
-          </a:xfrm>
-        </p:spPr>
-      </p:pic>
-      <p:sp>
-        <p:nvSpPr>
-          <p:cNvPr id="8" name="Frame 7"/>
-          <p:cNvSpPr/>
-          <p:nvPr/>
-        </p:nvSpPr>
-        <p:spPr>
-          <a:xfrm>
-            <a:off x="1935480" y="3093720"/>
-            <a:ext cx="5471160" cy="426720"/>
-          </a:xfrm>
-          <a:prstGeom prst="frame">
-            <a:avLst/>
-          </a:prstGeom>
-          <a:solidFill>
-            <a:srgbClr val="FF0000"/>
-          </a:solidFill>
-          <a:ln>
-            <a:solidFill>
-              <a:srgbClr val="FF0000"/>
-            </a:solidFill>
-          </a:ln>
-        </p:spPr>
-        <p:style>
-          <a:lnRef idx="2">
-            <a:schemeClr val="accent1">
-              <a:shade val="50000"/>
-            </a:schemeClr>
-          </a:lnRef>
-          <a:fillRef idx="1">
-            <a:schemeClr val="accent1"/>
-          </a:fillRef>
-          <a:effectRef idx="0">
-            <a:schemeClr val="accent1"/>
-          </a:effectRef>
-          <a:fontRef idx="minor">
-            <a:schemeClr val="lt1"/>
-          </a:fontRef>
-        </p:style>
-        <p:txBody>
-          <a:bodyPr rtlCol="0" anchor="ctr"/>
-          <a:lstStyle/>
-          <a:p>
-            <a:pPr algn="ctr"/>
-            <a:endParaRPr lang="en-US">
-              <a:solidFill>
-                <a:schemeClr val="tx1"/>
-              </a:solidFill>
-            </a:endParaRPr>
-          </a:p>
-        </p:txBody>
-      </p:sp>
-    </p:spTree>
-    <p:extLst>
-      <p:ext uri="{BB962C8B-B14F-4D97-AF65-F5344CB8AC3E}">
-        <p14:creationId xmlns:p14="http://schemas.microsoft.com/office/powerpoint/2010/main" val="1994693897"/>
-      </p:ext>
-    </p:extLst>
-  </p:cSld>
-  <p:clrMapOvr>
-    <a:masterClrMapping/>
-  </p:clrMapOvr>
-  <mc:AlternateContent xmlns:mc="http://schemas.openxmlformats.org/markup-compatibility/2006">
-    <mc:Choice xmlns:p14="http://schemas.microsoft.com/office/powerpoint/2010/main" Requires="p14">
-      <p:transition spd="slow" p14:dur="2000" advTm="9435"/>
-    </mc:Choice>
-    <mc:Fallback>
-      <p:transition spd="slow" advTm="9435"/>
-    </mc:Fallback>
-  </mc:AlternateContent>
-  <p:timing>
-    <p:tnLst>
-      <p:par>
-        <p:cTn id="1" dur="indefinite" restart="never" nodeType="tmRoot"/>
-      </p:par>
-    </p:tnLst>
-  </p:timing>
-</p:sld>
-</file>
-
-<file path=ppt/slides/slide14.xml><?xml version="1.0" encoding="utf-8"?>
-<p:sld xmlns:a="http://schemas.openxmlformats.org/drawingml/2006/main" xmlns:r="http://schemas.openxmlformats.org/officeDocument/2006/relationships" xmlns:p="http://schemas.openxmlformats.org/presentationml/2006/main">
-  <p:cSld>
-    <p:spTree>
-      <p:nvGrpSpPr>
-        <p:cNvPr id="1" name=""/>
-        <p:cNvGrpSpPr/>
-        <p:nvPr/>
-      </p:nvGrpSpPr>
-      <p:grpSpPr>
-        <a:xfrm>
-          <a:off x="0" y="0"/>
-          <a:ext cx="0" cy="0"/>
-          <a:chOff x="0" y="0"/>
-          <a:chExt cx="0" cy="0"/>
-        </a:xfrm>
-      </p:grpSpPr>
-      <p:sp>
-        <p:nvSpPr>
-          <p:cNvPr id="2" name="Title 1"/>
-          <p:cNvSpPr>
-            <a:spLocks noGrp="1"/>
-          </p:cNvSpPr>
-          <p:nvPr>
-            <p:ph type="title"/>
-          </p:nvPr>
-        </p:nvSpPr>
-        <p:spPr>
-          <a:xfrm>
-            <a:off x="789139" y="438599"/>
-            <a:ext cx="10546915" cy="638640"/>
-          </a:xfrm>
-          <a:solidFill>
-            <a:schemeClr val="bg2">
-              <a:lumMod val="75000"/>
-            </a:schemeClr>
-          </a:solidFill>
-        </p:spPr>
-        <p:txBody>
-          <a:bodyPr>
-            <a:normAutofit fontScale="90000"/>
-          </a:bodyPr>
-          <a:lstStyle/>
-          <a:p>
-            <a:r>
-              <a:rPr lang="en-US" b="1" cap="none" dirty="0" smtClean="0">
-                <a:latin typeface="Arial" charset="0"/>
-                <a:ea typeface="Arial" charset="0"/>
-                <a:cs typeface="Arial" charset="0"/>
-              </a:rPr>
-              <a:t>Improvements</a:t>
-            </a:r>
-            <a:endParaRPr lang="en-US" b="1" cap="none" dirty="0">
-              <a:latin typeface="Arial" charset="0"/>
-              <a:ea typeface="Arial" charset="0"/>
-              <a:cs typeface="Arial" charset="0"/>
-            </a:endParaRPr>
-          </a:p>
-        </p:txBody>
-      </p:sp>
-      <p:sp>
-        <p:nvSpPr>
-          <p:cNvPr id="5" name="Content Placeholder 4"/>
-          <p:cNvSpPr>
-            <a:spLocks noGrp="1"/>
-          </p:cNvSpPr>
-          <p:nvPr>
-            <p:ph idx="1"/>
-          </p:nvPr>
-        </p:nvSpPr>
-        <p:spPr>
-          <a:xfrm>
-            <a:off x="789139" y="1642534"/>
-            <a:ext cx="10546915" cy="4773506"/>
-          </a:xfrm>
-        </p:spPr>
-        <p:txBody>
-          <a:bodyPr>
-            <a:normAutofit/>
-          </a:bodyPr>
-          <a:lstStyle/>
-          <a:p>
-            <a:r>
-              <a:rPr lang="en-US" sz="3200" dirty="0" smtClean="0">
-                <a:ea typeface="Calibri" charset="0"/>
-                <a:cs typeface="Calibri" charset="0"/>
-              </a:rPr>
-              <a:t>Helper methods (converting pounds/pence &amp; pence/pounds) are duplicated in two models </a:t>
-            </a:r>
-            <a:r>
-              <a:rPr lang="mr-IN" sz="3200" dirty="0" smtClean="0">
-                <a:ea typeface="Calibri" charset="0"/>
-                <a:cs typeface="Calibri" charset="0"/>
-              </a:rPr>
-              <a:t>–</a:t>
-            </a:r>
-            <a:r>
-              <a:rPr lang="en-US" sz="3200" dirty="0" smtClean="0">
-                <a:ea typeface="Calibri" charset="0"/>
-                <a:cs typeface="Calibri" charset="0"/>
-              </a:rPr>
-              <a:t> need to refactor to move them into a separate helper class</a:t>
-            </a:r>
-          </a:p>
-          <a:p>
-            <a:r>
-              <a:rPr lang="en-US" sz="3200" dirty="0" smtClean="0">
-                <a:ea typeface="Calibri" charset="0"/>
-                <a:cs typeface="Calibri" charset="0"/>
-              </a:rPr>
-              <a:t>Need to improve how website responds to resizing the browser</a:t>
-            </a:r>
-          </a:p>
-          <a:p>
-            <a:pPr marL="685800" lvl="3" indent="0">
-              <a:buNone/>
-            </a:pPr>
-            <a:endParaRPr lang="en-US" sz="2200" dirty="0">
-              <a:latin typeface="Consolas" charset="0"/>
-              <a:ea typeface="Consolas" charset="0"/>
-              <a:cs typeface="Consolas" charset="0"/>
-            </a:endParaRPr>
-          </a:p>
-          <a:p>
-            <a:pPr lvl="3"/>
-            <a:endParaRPr lang="en-US" sz="2200" dirty="0"/>
-          </a:p>
-        </p:txBody>
-      </p:sp>
-    </p:spTree>
-    <p:extLst>
-      <p:ext uri="{BB962C8B-B14F-4D97-AF65-F5344CB8AC3E}">
-        <p14:creationId xmlns:p14="http://schemas.microsoft.com/office/powerpoint/2010/main" val="601805691"/>
-      </p:ext>
-    </p:extLst>
-  </p:cSld>
-  <p:clrMapOvr>
-    <a:masterClrMapping/>
-  </p:clrMapOvr>
-  <mc:AlternateContent xmlns:mc="http://schemas.openxmlformats.org/markup-compatibility/2006">
-    <mc:Choice xmlns:p14="http://schemas.microsoft.com/office/powerpoint/2010/main" Requires="p14">
-      <p:transition spd="slow" p14:dur="2000" advTm="29884"/>
-    </mc:Choice>
-    <mc:Fallback>
-      <p:transition spd="slow" advTm="29884"/>
-    </mc:Fallback>
-  </mc:AlternateContent>
-  <p:timing>
-    <p:tnLst>
-      <p:par>
-        <p:cTn id="1" dur="indefinite" restart="never" nodeType="tmRoot"/>
-      </p:par>
-    </p:tnLst>
-  </p:timing>
-</p:sld>
-</file>
-
-<file path=ppt/slides/slide15.xml><?xml version="1.0" encoding="utf-8"?>
-<p:sld xmlns:a="http://schemas.openxmlformats.org/drawingml/2006/main" xmlns:r="http://schemas.openxmlformats.org/officeDocument/2006/relationships" xmlns:p="http://schemas.openxmlformats.org/presentationml/2006/main">
-  <p:cSld>
-    <p:spTree>
-      <p:nvGrpSpPr>
-        <p:cNvPr id="1" name=""/>
-        <p:cNvGrpSpPr/>
-        <p:nvPr/>
-      </p:nvGrpSpPr>
-      <p:grpSpPr>
-        <a:xfrm>
-          <a:off x="0" y="0"/>
-          <a:ext cx="0" cy="0"/>
-          <a:chOff x="0" y="0"/>
-          <a:chExt cx="0" cy="0"/>
-        </a:xfrm>
-      </p:grpSpPr>
-      <p:sp>
-        <p:nvSpPr>
-          <p:cNvPr id="2" name="Title 1"/>
-          <p:cNvSpPr>
-            <a:spLocks noGrp="1"/>
-          </p:cNvSpPr>
-          <p:nvPr>
-            <p:ph type="title"/>
-          </p:nvPr>
-        </p:nvSpPr>
-        <p:spPr>
-          <a:xfrm>
-            <a:off x="789139" y="438599"/>
-            <a:ext cx="10546915" cy="638640"/>
-          </a:xfrm>
-          <a:solidFill>
-            <a:schemeClr val="bg2">
-              <a:lumMod val="75000"/>
-            </a:schemeClr>
-          </a:solidFill>
-        </p:spPr>
-        <p:txBody>
-          <a:bodyPr>
-            <a:normAutofit fontScale="90000"/>
-          </a:bodyPr>
-          <a:lstStyle/>
-          <a:p>
-            <a:r>
-              <a:rPr lang="en-US" b="1" cap="none" dirty="0" smtClean="0">
-                <a:latin typeface="Arial" charset="0"/>
-                <a:ea typeface="Arial" charset="0"/>
-                <a:cs typeface="Arial" charset="0"/>
-              </a:rPr>
-              <a:t>Learning Points</a:t>
-            </a:r>
-            <a:endParaRPr lang="en-US" b="1" cap="none" dirty="0">
-              <a:latin typeface="Arial" charset="0"/>
-              <a:ea typeface="Arial" charset="0"/>
-              <a:cs typeface="Arial" charset="0"/>
-            </a:endParaRPr>
-          </a:p>
-        </p:txBody>
-      </p:sp>
-      <p:sp>
-        <p:nvSpPr>
-          <p:cNvPr id="5" name="Content Placeholder 4"/>
-          <p:cNvSpPr>
-            <a:spLocks noGrp="1"/>
-          </p:cNvSpPr>
-          <p:nvPr>
-            <p:ph idx="1"/>
-          </p:nvPr>
-        </p:nvSpPr>
-        <p:spPr>
-          <a:xfrm>
-            <a:off x="789139" y="1642534"/>
-            <a:ext cx="10546915" cy="4773506"/>
-          </a:xfrm>
-        </p:spPr>
-        <p:txBody>
-          <a:bodyPr>
-            <a:normAutofit/>
-          </a:bodyPr>
-          <a:lstStyle/>
-          <a:p>
-            <a:r>
-              <a:rPr lang="en-US" sz="2800" dirty="0" smtClean="0"/>
-              <a:t>Planning is key</a:t>
-            </a:r>
-          </a:p>
-          <a:p>
-            <a:pPr lvl="1"/>
-            <a:r>
-              <a:rPr lang="en-US" sz="2400" dirty="0" smtClean="0"/>
-              <a:t>Planning the models, methods, controllers, views etc.</a:t>
-            </a:r>
-          </a:p>
-          <a:p>
-            <a:pPr lvl="1"/>
-            <a:r>
-              <a:rPr lang="en-US" sz="2400" dirty="0" smtClean="0"/>
-              <a:t>Having a clear vision of what the app should look like in the UI</a:t>
-            </a:r>
-          </a:p>
-          <a:p>
-            <a:r>
-              <a:rPr lang="en-US" sz="2800" dirty="0" smtClean="0"/>
-              <a:t>Sinatra is picky about ( ) in </a:t>
-            </a:r>
-            <a:r>
-              <a:rPr lang="en-US" sz="2800" dirty="0" err="1" smtClean="0"/>
-              <a:t>erb</a:t>
-            </a:r>
-            <a:r>
-              <a:rPr lang="en-US" sz="2800" dirty="0" smtClean="0"/>
-              <a:t> tags.</a:t>
-            </a:r>
-          </a:p>
-          <a:p>
-            <a:pPr lvl="1"/>
-            <a:r>
-              <a:rPr lang="en-US" sz="2400" dirty="0" smtClean="0"/>
-              <a:t>This works:</a:t>
-            </a:r>
-          </a:p>
-          <a:p>
-            <a:pPr marL="685800" lvl="3" indent="0">
-              <a:buNone/>
-            </a:pPr>
-            <a:r>
-              <a:rPr lang="en-US" sz="2200" dirty="0" smtClean="0"/>
-              <a:t>	</a:t>
-            </a:r>
-            <a:r>
-              <a:rPr lang="en-US" sz="2200" dirty="0" smtClean="0">
-                <a:latin typeface="Consolas" charset="0"/>
-                <a:ea typeface="Consolas" charset="0"/>
-                <a:cs typeface="Consolas" charset="0"/>
-              </a:rPr>
-              <a:t>&lt;%= (</a:t>
-            </a:r>
-            <a:r>
-              <a:rPr lang="en-US" sz="2200" dirty="0" err="1" smtClean="0">
-                <a:latin typeface="Consolas" charset="0"/>
-                <a:ea typeface="Consolas" charset="0"/>
-                <a:cs typeface="Consolas" charset="0"/>
-              </a:rPr>
-              <a:t>Transaction.total.to_f</a:t>
-            </a:r>
-            <a:r>
-              <a:rPr lang="en-US" sz="2200" dirty="0" smtClean="0">
-                <a:latin typeface="Consolas" charset="0"/>
-                <a:ea typeface="Consolas" charset="0"/>
-                <a:cs typeface="Consolas" charset="0"/>
-              </a:rPr>
-              <a:t>() /100) %&gt;</a:t>
-            </a:r>
-          </a:p>
-          <a:p>
-            <a:pPr lvl="1"/>
-            <a:r>
-              <a:rPr lang="en-US" sz="2400" dirty="0" smtClean="0"/>
-              <a:t>This doesn’t!:</a:t>
-            </a:r>
-          </a:p>
-          <a:p>
-            <a:pPr marL="685800" lvl="3" indent="0">
-              <a:buNone/>
-            </a:pPr>
-            <a:r>
-              <a:rPr lang="en-US" sz="2200" dirty="0" smtClean="0"/>
-              <a:t> 	</a:t>
-            </a:r>
-            <a:r>
-              <a:rPr lang="en-US" sz="2200" dirty="0" smtClean="0">
-                <a:latin typeface="Consolas" charset="0"/>
-                <a:ea typeface="Consolas" charset="0"/>
-                <a:cs typeface="Consolas" charset="0"/>
-              </a:rPr>
-              <a:t>&lt;%= </a:t>
-            </a:r>
-            <a:r>
-              <a:rPr lang="en-US" sz="2200" dirty="0">
-                <a:latin typeface="Consolas" charset="0"/>
-                <a:ea typeface="Consolas" charset="0"/>
-                <a:cs typeface="Consolas" charset="0"/>
-              </a:rPr>
-              <a:t>(</a:t>
-            </a:r>
-            <a:r>
-              <a:rPr lang="en-US" sz="2200" dirty="0" err="1" smtClean="0">
-                <a:latin typeface="Consolas" charset="0"/>
-                <a:ea typeface="Consolas" charset="0"/>
-                <a:cs typeface="Consolas" charset="0"/>
-              </a:rPr>
-              <a:t>Transaction.total.to_f</a:t>
-            </a:r>
-            <a:r>
-              <a:rPr lang="en-US" sz="2200" dirty="0" smtClean="0">
-                <a:latin typeface="Consolas" charset="0"/>
-                <a:ea typeface="Consolas" charset="0"/>
-                <a:cs typeface="Consolas" charset="0"/>
-              </a:rPr>
-              <a:t> </a:t>
-            </a:r>
-            <a:r>
-              <a:rPr lang="en-US" sz="2200" dirty="0">
-                <a:latin typeface="Consolas" charset="0"/>
-                <a:ea typeface="Consolas" charset="0"/>
-                <a:cs typeface="Consolas" charset="0"/>
-              </a:rPr>
-              <a:t>/100) </a:t>
-            </a:r>
-            <a:r>
-              <a:rPr lang="en-US" sz="2200" dirty="0" smtClean="0">
-                <a:latin typeface="Consolas" charset="0"/>
-                <a:ea typeface="Consolas" charset="0"/>
-                <a:cs typeface="Consolas" charset="0"/>
-              </a:rPr>
-              <a:t>%&gt;</a:t>
-            </a:r>
-          </a:p>
-          <a:p>
-            <a:pPr marL="685800" lvl="3" indent="0">
-              <a:buNone/>
-            </a:pPr>
-            <a:endParaRPr lang="en-US" sz="2200" dirty="0">
-              <a:latin typeface="Consolas" charset="0"/>
-              <a:ea typeface="Consolas" charset="0"/>
-              <a:cs typeface="Consolas" charset="0"/>
-            </a:endParaRPr>
-          </a:p>
-          <a:p>
-            <a:pPr lvl="3"/>
-            <a:endParaRPr lang="en-US" sz="2200" dirty="0"/>
-          </a:p>
-        </p:txBody>
-      </p:sp>
-    </p:spTree>
-    <p:extLst>
-      <p:ext uri="{BB962C8B-B14F-4D97-AF65-F5344CB8AC3E}">
-        <p14:creationId xmlns:p14="http://schemas.microsoft.com/office/powerpoint/2010/main" val="108158784"/>
-      </p:ext>
-    </p:extLst>
-  </p:cSld>
-  <p:clrMapOvr>
-    <a:masterClrMapping/>
-  </p:clrMapOvr>
-  <mc:AlternateContent xmlns:mc="http://schemas.openxmlformats.org/markup-compatibility/2006">
-    <mc:Choice xmlns:p14="http://schemas.microsoft.com/office/powerpoint/2010/main" Requires="p14">
-      <p:transition spd="slow" p14:dur="2000" advTm="80304"/>
-    </mc:Choice>
-    <mc:Fallback>
-      <p:transition spd="slow" advTm="80304"/>
-    </mc:Fallback>
-  </mc:AlternateContent>
-  <p:timing>
-    <p:tnLst>
-      <p:par>
-        <p:cTn id="1" dur="indefinite" restart="never" nodeType="tmRoot"/>
-      </p:par>
-    </p:tnLst>
-  </p:timing>
-</p:sld>
-</file>
-
-<file path=ppt/slides/slide2.xml><?xml version="1.0" encoding="utf-8"?>
-<p:sld xmlns:a="http://schemas.openxmlformats.org/drawingml/2006/main" xmlns:r="http://schemas.openxmlformats.org/officeDocument/2006/relationships" xmlns:p="http://schemas.openxmlformats.org/presentationml/2006/main">
-  <p:cSld>
-    <p:spTree>
-      <p:nvGrpSpPr>
-        <p:cNvPr id="1" name=""/>
-        <p:cNvGrpSpPr/>
-        <p:nvPr/>
-      </p:nvGrpSpPr>
-      <p:grpSpPr>
-        <a:xfrm>
-          <a:off x="0" y="0"/>
-          <a:ext cx="0" cy="0"/>
-          <a:chOff x="0" y="0"/>
-          <a:chExt cx="0" cy="0"/>
-        </a:xfrm>
-      </p:grpSpPr>
-      <p:sp>
-        <p:nvSpPr>
-          <p:cNvPr id="2" name="Title 1"/>
-          <p:cNvSpPr>
-            <a:spLocks noGrp="1"/>
-          </p:cNvSpPr>
-          <p:nvPr>
-            <p:ph type="title"/>
-          </p:nvPr>
-        </p:nvSpPr>
-        <p:spPr>
-          <a:xfrm>
-            <a:off x="789139" y="438599"/>
-            <a:ext cx="10546915" cy="638640"/>
-          </a:xfrm>
-          <a:solidFill>
-            <a:schemeClr val="bg2">
-              <a:lumMod val="75000"/>
-            </a:schemeClr>
-          </a:solidFill>
-        </p:spPr>
-        <p:txBody>
-          <a:bodyPr>
-            <a:normAutofit fontScale="90000"/>
-          </a:bodyPr>
-          <a:lstStyle/>
-          <a:p>
-            <a:r>
-              <a:rPr lang="en-US" b="1" cap="none" dirty="0" smtClean="0">
-                <a:latin typeface="Arial" charset="0"/>
-                <a:ea typeface="Arial" charset="0"/>
-                <a:cs typeface="Arial" charset="0"/>
-              </a:rPr>
-              <a:t>Planning</a:t>
-            </a:r>
-            <a:endParaRPr lang="en-US" b="1" cap="none" dirty="0">
-              <a:latin typeface="Arial" charset="0"/>
-              <a:ea typeface="Arial" charset="0"/>
-              <a:cs typeface="Arial" charset="0"/>
-            </a:endParaRPr>
-          </a:p>
-        </p:txBody>
-      </p:sp>
-      <p:sp>
-        <p:nvSpPr>
-          <p:cNvPr id="3" name="Content Placeholder 2"/>
-          <p:cNvSpPr>
-            <a:spLocks noGrp="1"/>
-          </p:cNvSpPr>
-          <p:nvPr>
-            <p:ph idx="1"/>
-          </p:nvPr>
-        </p:nvSpPr>
-        <p:spPr>
-          <a:xfrm>
-            <a:off x="789139" y="1390389"/>
-            <a:ext cx="10546915" cy="4534421"/>
-          </a:xfrm>
-        </p:spPr>
-        <p:txBody>
-          <a:bodyPr>
-            <a:normAutofit/>
-          </a:bodyPr>
-          <a:lstStyle/>
-          <a:p>
-            <a:pPr fontAlgn="ctr"/>
-            <a:r>
-              <a:rPr lang="en-GB" sz="2800" dirty="0"/>
-              <a:t>Mostly planned back </a:t>
-            </a:r>
-            <a:r>
-              <a:rPr lang="en-GB" sz="2800" dirty="0" smtClean="0"/>
-              <a:t>end:</a:t>
-            </a:r>
-          </a:p>
-          <a:p>
-            <a:pPr lvl="1" fontAlgn="ctr"/>
-            <a:r>
-              <a:rPr lang="en-GB" sz="2800" dirty="0" err="1" smtClean="0"/>
-              <a:t>db</a:t>
-            </a:r>
-            <a:r>
-              <a:rPr lang="en-GB" sz="2800" dirty="0" smtClean="0"/>
-              <a:t> tables</a:t>
-            </a:r>
-          </a:p>
-          <a:p>
-            <a:pPr lvl="1" fontAlgn="ctr"/>
-            <a:r>
-              <a:rPr lang="en-GB" sz="2800" dirty="0" smtClean="0"/>
-              <a:t>models/methods,</a:t>
-            </a:r>
-          </a:p>
-          <a:p>
-            <a:pPr lvl="1" fontAlgn="ctr"/>
-            <a:r>
-              <a:rPr lang="en-GB" sz="2800" dirty="0" smtClean="0"/>
-              <a:t>controllers/views</a:t>
-            </a:r>
-            <a:endParaRPr lang="en-GB" sz="2800" dirty="0"/>
-          </a:p>
-          <a:p>
-            <a:pPr fontAlgn="ctr"/>
-            <a:r>
-              <a:rPr lang="en-GB" sz="2800" dirty="0" smtClean="0">
-                <a:hlinkClick r:id="rId2"/>
-              </a:rPr>
-              <a:t>Trello Board</a:t>
-            </a:r>
-            <a:endParaRPr lang="en-GB" sz="2800" dirty="0" smtClean="0"/>
-          </a:p>
-          <a:p>
-            <a:pPr fontAlgn="ctr"/>
-            <a:r>
-              <a:rPr lang="en-GB" sz="2800" dirty="0" smtClean="0"/>
-              <a:t>Class diagram</a:t>
-            </a:r>
-            <a:endParaRPr lang="en-GB" sz="2800" dirty="0"/>
-          </a:p>
-          <a:p>
-            <a:pPr fontAlgn="ctr"/>
-            <a:r>
-              <a:rPr lang="en-GB" sz="2800" dirty="0" smtClean="0"/>
-              <a:t>Planned the front end very early on </a:t>
-            </a:r>
-            <a:r>
-              <a:rPr lang="mr-IN" sz="2800" dirty="0" smtClean="0"/>
-              <a:t>–</a:t>
-            </a:r>
-            <a:r>
-              <a:rPr lang="en-GB" sz="2800" dirty="0" smtClean="0"/>
-              <a:t> created wireframe diagram last Friday</a:t>
-            </a:r>
-            <a:endParaRPr lang="en-GB" sz="2800" dirty="0"/>
-          </a:p>
-        </p:txBody>
-      </p:sp>
-    </p:spTree>
-    <p:extLst>
-      <p:ext uri="{BB962C8B-B14F-4D97-AF65-F5344CB8AC3E}">
-        <p14:creationId xmlns:p14="http://schemas.microsoft.com/office/powerpoint/2010/main" val="922338988"/>
-      </p:ext>
-    </p:extLst>
-  </p:cSld>
-  <p:clrMapOvr>
-    <a:masterClrMapping/>
-  </p:clrMapOvr>
-  <mc:AlternateContent xmlns:mc="http://schemas.openxmlformats.org/markup-compatibility/2006">
-    <mc:Choice xmlns:p14="http://schemas.microsoft.com/office/powerpoint/2010/main" Requires="p14">
-      <p:transition spd="slow" p14:dur="2000" advTm="105910"/>
-    </mc:Choice>
-    <mc:Fallback>
-      <p:transition spd="slow" advTm="105910"/>
     </mc:Fallback>
   </mc:AlternateContent>
   <p:timing>
@@ -6034,23 +6062,7 @@
                 <a:ea typeface="Arial" charset="0"/>
                 <a:cs typeface="Arial" charset="0"/>
               </a:rPr>
-              <a:t>Planning </a:t>
-            </a:r>
-            <a:r>
-              <a:rPr lang="mr-IN" b="1" cap="none" dirty="0" smtClean="0">
-                <a:latin typeface="Arial" charset="0"/>
-                <a:ea typeface="Arial" charset="0"/>
-                <a:cs typeface="Arial" charset="0"/>
-              </a:rPr>
-              <a:t>–</a:t>
-            </a:r>
-            <a:r>
-              <a:rPr lang="en-US" b="1" cap="none" dirty="0" smtClean="0">
-                <a:latin typeface="Arial" charset="0"/>
-                <a:ea typeface="Arial" charset="0"/>
-                <a:cs typeface="Arial" charset="0"/>
-              </a:rPr>
-              <a:t> Back End</a:t>
+              <a:t>Planning</a:t>
             </a:r>
             <a:endParaRPr lang="en-US" b="1" cap="none" dirty="0">
               <a:latin typeface="Arial" charset="0"/>
@@ -6062,7 +6074,7 @@
       </p:sp>
       <p:sp>
         <p:nvSpPr>
-          <p:cNvPr id="5" name="Content Placeholder 4"/>
+          <p:cNvPr id="3" name="Content Placeholder 2"/>
           <p:cNvSpPr>
             <a:spLocks noGrp="1"/>
           </p:cNvSpPr>
@@ -6072,8 +6084,8 @@
         </p:nvSpPr>
         <p:spPr>
           <a:xfrm>
-            <a:off x="789139" y="1615440"/>
-            <a:ext cx="10546915" cy="4124587"/>
+            <a:off x="789139" y="1390389"/>
+            <a:ext cx="10546915" cy="4534421"/>
           </a:xfrm>
         </p:spPr>
         <p:txBody>
@@ -6082,55 +6094,94 @@
           </a:bodyPr>
           <a:lstStyle/>
           <a:p>
-            <a:r>
-              <a:rPr lang="en-US" sz="2800" dirty="0" smtClean="0">
-                <a:solidFill>
-                  <a:schemeClr val="tx1"/>
-                </a:solidFill>
-                <a:hlinkClick r:id="rId2" action="ppaction://hlinkfile"/>
+            <a:pPr fontAlgn="ctr"/>
+            <a:r>
+              <a:rPr lang="en-GB" sz="2800" dirty="0"/>
+              <a:t>Mostly planned back </a:t>
+            </a:r>
+            <a:r>
+              <a:rPr lang="en-GB" sz="2800" dirty="0" smtClean="0"/>
+              <a:t>end:</a:t>
+            </a:r>
+          </a:p>
+          <a:p>
+            <a:pPr lvl="1" fontAlgn="ctr"/>
+            <a:r>
+              <a:rPr lang="en-GB" sz="2800" dirty="0" err="1" smtClean="0"/>
+              <a:t>db</a:t>
+            </a:r>
+            <a:r>
+              <a:rPr lang="en-GB" sz="2800" dirty="0" smtClean="0"/>
+              <a:t> tables</a:t>
+            </a:r>
+          </a:p>
+          <a:p>
+            <a:pPr lvl="1" fontAlgn="ctr"/>
+            <a:r>
+              <a:rPr lang="en-GB" sz="2800" dirty="0" smtClean="0"/>
+              <a:t>models/methods,</a:t>
+            </a:r>
+          </a:p>
+          <a:p>
+            <a:pPr lvl="1" fontAlgn="ctr"/>
+            <a:r>
+              <a:rPr lang="en-GB" sz="2800" dirty="0" smtClean="0"/>
+              <a:t>controllers/views</a:t>
+            </a:r>
+            <a:endParaRPr lang="en-GB" sz="2800" dirty="0"/>
+          </a:p>
+          <a:p>
+            <a:pPr fontAlgn="ctr"/>
+            <a:r>
+              <a:rPr lang="en-GB" sz="2800" dirty="0" smtClean="0">
+                <a:hlinkClick r:id="rId2"/>
               </a:rPr>
-              <a:t>File_structure.docx</a:t>
-            </a:r>
-            <a:endParaRPr lang="en-US" sz="2800" dirty="0" smtClean="0">
-              <a:solidFill>
-                <a:schemeClr val="tx1"/>
-              </a:solidFill>
-            </a:endParaRPr>
-          </a:p>
-          <a:p>
-            <a:r>
-              <a:rPr lang="en-US" sz="2800" dirty="0" smtClean="0">
-                <a:solidFill>
-                  <a:schemeClr val="tx1"/>
-                </a:solidFill>
-                <a:hlinkClick r:id="rId3" action="ppaction://hlinkfile"/>
-              </a:rPr>
-              <a:t>Methods_and_views.docx</a:t>
-            </a:r>
-            <a:endParaRPr lang="en-US" sz="2800" dirty="0">
-              <a:solidFill>
-                <a:schemeClr val="tx1"/>
-              </a:solidFill>
-            </a:endParaRPr>
+              <a:t>Trello Board</a:t>
+            </a:r>
+            <a:endParaRPr lang="en-GB" sz="2800" dirty="0" smtClean="0"/>
+          </a:p>
+          <a:p>
+            <a:pPr fontAlgn="ctr"/>
+            <a:r>
+              <a:rPr lang="en-GB" sz="2800" dirty="0" smtClean="0"/>
+              <a:t>Class diagram</a:t>
+            </a:r>
+            <a:endParaRPr lang="en-GB" sz="2800" dirty="0"/>
+          </a:p>
+          <a:p>
+            <a:pPr fontAlgn="ctr"/>
+            <a:r>
+              <a:rPr lang="en-GB" sz="2800" dirty="0" smtClean="0"/>
+              <a:t>Planned the front end very early on </a:t>
+            </a:r>
+            <a:r>
+              <a:rPr lang="mr-IN" sz="2800" dirty="0" smtClean="0"/>
+              <a:t>–</a:t>
+            </a:r>
+            <a:r>
+              <a:rPr lang="en-GB" sz="2800" dirty="0" smtClean="0"/>
+              <a:t> created wireframe diagram last Friday</a:t>
+            </a:r>
+            <a:endParaRPr lang="en-GB" sz="2800" dirty="0"/>
           </a:p>
         </p:txBody>
       </p:sp>
     </p:spTree>
     <p:extLst>
       <p:ext uri="{BB962C8B-B14F-4D97-AF65-F5344CB8AC3E}">
-        <p14:creationId xmlns:p14="http://schemas.microsoft.com/office/powerpoint/2010/main" val="1153080674"/>
+        <p14:creationId xmlns:p14="http://schemas.microsoft.com/office/powerpoint/2010/main" val="1366995825"/>
       </p:ext>
     </p:extLst>
   </p:cSld>
   <p:clrMapOvr>
     <a:masterClrMapping/>
   </p:clrMapOvr>
-  <mc:AlternateContent xmlns:mc="http://schemas.openxmlformats.org/markup-compatibility/2006">
-    <mc:Choice xmlns:p14="http://schemas.microsoft.com/office/powerpoint/2010/main" Requires="p14">
-      <p:transition spd="slow" p14:dur="2000" advTm="16376"/>
+  <mc:AlternateContent xmlns:mc="http://schemas.openxmlformats.org/markup-compatibility/2006" xmlns:p14="http://schemas.microsoft.com/office/powerpoint/2010/main">
+    <mc:Choice Requires="p14">
+      <p:transition spd="slow" p14:dur="2000" advTm="105910"/>
     </mc:Choice>
-    <mc:Fallback>
-      <p:transition spd="slow" advTm="16376"/>
+    <mc:Fallback xmlns="">
+      <p:transition spd="slow" advTm="105910"/>
     </mc:Fallback>
   </mc:AlternateContent>
   <p:timing>
@@ -6258,11 +6309,11 @@
   <p:clrMapOvr>
     <a:masterClrMapping/>
   </p:clrMapOvr>
-  <mc:AlternateContent xmlns:mc="http://schemas.openxmlformats.org/markup-compatibility/2006">
-    <mc:Choice xmlns:p14="http://schemas.microsoft.com/office/powerpoint/2010/main" Requires="p14">
+  <mc:AlternateContent xmlns:mc="http://schemas.openxmlformats.org/markup-compatibility/2006" xmlns:p14="http://schemas.microsoft.com/office/powerpoint/2010/main">
+    <mc:Choice Requires="p14">
       <p:transition spd="slow" p14:dur="2000" advTm="19805"/>
     </mc:Choice>
-    <mc:Fallback>
+    <mc:Fallback xmlns="">
       <p:transition spd="slow" advTm="19805"/>
     </mc:Fallback>
   </mc:AlternateContent>
@@ -6354,7 +6405,7 @@
       </p:sp>
       <p:pic>
         <p:nvPicPr>
-          <p:cNvPr id="4" name="Content Placeholder 3"/>
+          <p:cNvPr id="5" name="Content Placeholder 4"/>
           <p:cNvPicPr>
             <a:picLocks noGrp="1" noChangeAspect="1"/>
           </p:cNvPicPr>
@@ -6376,8 +6427,8 @@
         </p:blipFill>
         <p:spPr>
           <a:xfrm>
-            <a:off x="2963472" y="1403175"/>
-            <a:ext cx="6198248" cy="5079609"/>
+            <a:off x="2673843" y="1312544"/>
+            <a:ext cx="6777505" cy="5240655"/>
           </a:xfrm>
         </p:spPr>
       </p:pic>
@@ -6391,11 +6442,11 @@
   <p:clrMapOvr>
     <a:masterClrMapping/>
   </p:clrMapOvr>
-  <mc:AlternateContent xmlns:mc="http://schemas.openxmlformats.org/markup-compatibility/2006">
-    <mc:Choice xmlns:p14="http://schemas.microsoft.com/office/powerpoint/2010/main" Requires="p14">
+  <mc:AlternateContent xmlns:mc="http://schemas.openxmlformats.org/markup-compatibility/2006" xmlns:p14="http://schemas.microsoft.com/office/powerpoint/2010/main">
+    <mc:Choice Requires="p14">
       <p:transition spd="slow" p14:dur="2000" advTm="14612"/>
     </mc:Choice>
-    <mc:Fallback>
+    <mc:Fallback xmlns="">
       <p:transition spd="slow" advTm="14612"/>
     </mc:Fallback>
   </mc:AlternateContent>
@@ -6573,11 +6624,11 @@
   <p:clrMapOvr>
     <a:masterClrMapping/>
   </p:clrMapOvr>
-  <mc:AlternateContent xmlns:mc="http://schemas.openxmlformats.org/markup-compatibility/2006">
-    <mc:Choice xmlns:p14="http://schemas.microsoft.com/office/powerpoint/2010/main" Requires="p14">
+  <mc:AlternateContent xmlns:mc="http://schemas.openxmlformats.org/markup-compatibility/2006" xmlns:p14="http://schemas.microsoft.com/office/powerpoint/2010/main">
+    <mc:Choice Requires="p14">
       <p:transition spd="slow" p14:dur="2000" advTm="41462"/>
     </mc:Choice>
-    <mc:Fallback>
+    <mc:Fallback xmlns="">
       <p:transition spd="slow" advTm="41462"/>
     </mc:Fallback>
   </mc:AlternateContent>
@@ -6706,11 +6757,11 @@
   <p:clrMapOvr>
     <a:masterClrMapping/>
   </p:clrMapOvr>
-  <mc:AlternateContent xmlns:mc="http://schemas.openxmlformats.org/markup-compatibility/2006">
-    <mc:Choice xmlns:p14="http://schemas.microsoft.com/office/powerpoint/2010/main" Requires="p14">
+  <mc:AlternateContent xmlns:mc="http://schemas.openxmlformats.org/markup-compatibility/2006" xmlns:p14="http://schemas.microsoft.com/office/powerpoint/2010/main">
+    <mc:Choice Requires="p14">
       <p:transition spd="slow" p14:dur="2000" advTm="26546"/>
     </mc:Choice>
-    <mc:Fallback>
+    <mc:Fallback xmlns="">
       <p:transition spd="slow" advTm="26546"/>
     </mc:Fallback>
   </mc:AlternateContent>
@@ -6813,11 +6864,11 @@
   <p:clrMapOvr>
     <a:masterClrMapping/>
   </p:clrMapOvr>
-  <mc:AlternateContent xmlns:mc="http://schemas.openxmlformats.org/markup-compatibility/2006">
-    <mc:Choice xmlns:p14="http://schemas.microsoft.com/office/powerpoint/2010/main" Requires="p14">
+  <mc:AlternateContent xmlns:mc="http://schemas.openxmlformats.org/markup-compatibility/2006" xmlns:p14="http://schemas.microsoft.com/office/powerpoint/2010/main">
+    <mc:Choice Requires="p14">
       <p:transition spd="slow" p14:dur="2000" advTm="9775"/>
     </mc:Choice>
-    <mc:Fallback>
+    <mc:Fallback xmlns="">
       <p:transition spd="slow" advTm="9775"/>
     </mc:Fallback>
   </mc:AlternateContent>
@@ -6946,11 +6997,11 @@
   <p:clrMapOvr>
     <a:masterClrMapping/>
   </p:clrMapOvr>
-  <mc:AlternateContent xmlns:mc="http://schemas.openxmlformats.org/markup-compatibility/2006">
-    <mc:Choice xmlns:p14="http://schemas.microsoft.com/office/powerpoint/2010/main" Requires="p14">
+  <mc:AlternateContent xmlns:mc="http://schemas.openxmlformats.org/markup-compatibility/2006" xmlns:p14="http://schemas.microsoft.com/office/powerpoint/2010/main">
+    <mc:Choice Requires="p14">
       <p:transition spd="slow" p14:dur="2000" advTm="186195"/>
     </mc:Choice>
-    <mc:Fallback>
+    <mc:Fallback xmlns="">
       <p:transition spd="slow" advTm="186195"/>
     </mc:Fallback>
   </mc:AlternateContent>

</xml_diff>